<commit_message>
Finalized charts and powerpoint.
</commit_message>
<xml_diff>
--- a/covid19.pptx
+++ b/covid19.pptx
@@ -22,7 +22,6 @@
     <p:sldId id="270" r:id="rId16"/>
     <p:sldId id="271" r:id="rId17"/>
     <p:sldId id="272" r:id="rId18"/>
-    <p:sldId id="273" r:id="rId19"/>
   </p:sldIdLst>
   <p:sldSz cx="9144000" cy="6858000" type="screen4x3"/>
   <p:notesSz cx="6858000" cy="9144000"/>
@@ -3377,41 +3376,39 @@
             </a:r>
             <a:r>
               <a:rPr/>
-              <a:t>Forecast</a:t>
-            </a:r>
-          </a:p>
-        </p:txBody>
-      </p:sp>
-      <p:pic>
-        <p:nvPicPr>
-          <p:cNvPr descr="covid19_files/figure-pptx/unnamed-chunk-10-1.png" id="0" name="Picture 1"/>
-          <p:cNvPicPr>
-            <a:picLocks noGrp="1" noChangeAspect="1"/>
-          </p:cNvPicPr>
-          <p:nvPr/>
-        </p:nvPicPr>
-        <p:blipFill>
-          <a:blip r:embed="rId2"/>
-          <a:stretch>
-            <a:fillRect/>
-          </a:stretch>
-        </p:blipFill>
-        <p:spPr bwMode="auto">
-          <a:xfrm>
-            <a:off x="1752600" y="1600200"/>
-            <a:ext cx="5651500" cy="4521200"/>
-          </a:xfrm>
-          <a:prstGeom prst="rect">
-            <a:avLst/>
-          </a:prstGeom>
-          <a:noFill/>
-          <a:ln w="9525">
-            <a:noFill/>
-            <a:headEnd/>
-            <a:tailEnd/>
-          </a:ln>
-        </p:spPr>
-      </p:pic>
+              <a:t>Accuracy</a:t>
+            </a:r>
+          </a:p>
+        </p:txBody>
+      </p:sp>
+      <p:sp>
+        <p:nvSpPr>
+          <p:cNvPr id="3" name="Content Placeholder 2"/>
+          <p:cNvSpPr>
+            <a:spLocks noGrp="1"/>
+          </p:cNvSpPr>
+          <p:nvPr>
+            <p:ph idx="1"/>
+          </p:nvPr>
+        </p:nvSpPr>
+        <p:spPr/>
+        <p:txBody>
+          <a:bodyPr/>
+          <a:lstStyle/>
+          <a:p>
+            <a:pPr lvl="0" marL="1270000" indent="0">
+              <a:buNone/>
+            </a:pPr>
+            <a:r>
+              <a:rPr sz="1800">
+                <a:latin typeface="Courier"/>
+              </a:rPr>
+              <a:t>##              ME   RMSE    MAE  MPE MAPE  ACF1 Theil's U
+## Test set 178750 180219 178750 27.8 27.8 0.578      6.23</a:t>
+            </a:r>
+          </a:p>
+        </p:txBody>
+      </p:sp>
     </p:spTree>
   </p:cSld>
 </p:sld>
@@ -3454,97 +3451,6 @@
             </a:pPr>
             <a:r>
               <a:rPr/>
-              <a:t>Quadratic</a:t>
-            </a:r>
-            <a:r>
-              <a:rPr/>
-              <a:t> </a:t>
-            </a:r>
-            <a:r>
-              <a:rPr/>
-              <a:t>Model:</a:t>
-            </a:r>
-            <a:r>
-              <a:rPr/>
-              <a:t> </a:t>
-            </a:r>
-            <a:r>
-              <a:rPr/>
-              <a:t>Accuracy</a:t>
-            </a:r>
-          </a:p>
-        </p:txBody>
-      </p:sp>
-      <p:sp>
-        <p:nvSpPr>
-          <p:cNvPr id="3" name="Content Placeholder 2"/>
-          <p:cNvSpPr>
-            <a:spLocks noGrp="1"/>
-          </p:cNvSpPr>
-          <p:nvPr>
-            <p:ph idx="1"/>
-          </p:nvPr>
-        </p:nvSpPr>
-        <p:spPr/>
-        <p:txBody>
-          <a:bodyPr/>
-          <a:lstStyle/>
-          <a:p>
-            <a:pPr lvl="0" marL="1270000" indent="0">
-              <a:buNone/>
-            </a:pPr>
-            <a:r>
-              <a:rPr sz="1800">
-                <a:latin typeface="Courier"/>
-              </a:rPr>
-              <a:t>##              ME   RMSE    MAE  MPE MAPE  ACF1 Theil's U
-## Test set 178750 180219 178750 27.8 27.8 0.578      6.23</a:t>
-            </a:r>
-          </a:p>
-        </p:txBody>
-      </p:sp>
-    </p:spTree>
-  </p:cSld>
-</p:sld>
-</file>
-
-<file path=ppt/slides/slide12.xml><?xml version="1.0" encoding="utf-8"?>
-<p:sld xmlns:a="http://schemas.openxmlformats.org/drawingml/2006/main" xmlns:r="http://schemas.openxmlformats.org/officeDocument/2006/relationships" xmlns:p="http://schemas.openxmlformats.org/presentationml/2006/main">
-  <p:cSld>
-    <p:spTree>
-      <p:nvGrpSpPr>
-        <p:cNvPr id="1" name=""/>
-        <p:cNvGrpSpPr/>
-        <p:nvPr/>
-      </p:nvGrpSpPr>
-      <p:grpSpPr>
-        <a:xfrm>
-          <a:off x="0" y="0"/>
-          <a:ext cx="0" cy="0"/>
-          <a:chOff x="0" y="0"/>
-          <a:chExt cx="0" cy="0"/>
-        </a:xfrm>
-      </p:grpSpPr>
-      <p:sp>
-        <p:nvSpPr>
-          <p:cNvPr id="2" name="Title 1"/>
-          <p:cNvSpPr>
-            <a:spLocks noGrp="1"/>
-          </p:cNvSpPr>
-          <p:nvPr>
-            <p:ph type="title"/>
-          </p:nvPr>
-        </p:nvSpPr>
-        <p:spPr/>
-        <p:txBody>
-          <a:bodyPr/>
-          <a:lstStyle/>
-          <a:p>
-            <a:pPr lvl="0" marL="0" indent="0">
-              <a:buNone/>
-            </a:pPr>
-            <a:r>
-              <a:rPr/>
               <a:t>Exponential</a:t>
             </a:r>
             <a:r>
@@ -3607,7 +3513,7 @@
 </p:sld>
 </file>
 
-<file path=ppt/slides/slide13.xml><?xml version="1.0" encoding="utf-8"?>
+<file path=ppt/slides/slide12.xml><?xml version="1.0" encoding="utf-8"?>
 <p:sld xmlns:a="http://schemas.openxmlformats.org/drawingml/2006/main" xmlns:r="http://schemas.openxmlformats.org/officeDocument/2006/relationships" xmlns:p="http://schemas.openxmlformats.org/presentationml/2006/main">
   <p:cSld>
     <p:spTree>
@@ -3700,6 +3606,97 @@
 </p:sld>
 </file>
 
+<file path=ppt/slides/slide13.xml><?xml version="1.0" encoding="utf-8"?>
+<p:sld xmlns:a="http://schemas.openxmlformats.org/drawingml/2006/main" xmlns:r="http://schemas.openxmlformats.org/officeDocument/2006/relationships" xmlns:p="http://schemas.openxmlformats.org/presentationml/2006/main">
+  <p:cSld>
+    <p:spTree>
+      <p:nvGrpSpPr>
+        <p:cNvPr id="1" name=""/>
+        <p:cNvGrpSpPr/>
+        <p:nvPr/>
+      </p:nvGrpSpPr>
+      <p:grpSpPr>
+        <a:xfrm>
+          <a:off x="0" y="0"/>
+          <a:ext cx="0" cy="0"/>
+          <a:chOff x="0" y="0"/>
+          <a:chExt cx="0" cy="0"/>
+        </a:xfrm>
+      </p:grpSpPr>
+      <p:sp>
+        <p:nvSpPr>
+          <p:cNvPr id="2" name="Title 1"/>
+          <p:cNvSpPr>
+            <a:spLocks noGrp="1"/>
+          </p:cNvSpPr>
+          <p:nvPr>
+            <p:ph type="title"/>
+          </p:nvPr>
+        </p:nvSpPr>
+        <p:spPr/>
+        <p:txBody>
+          <a:bodyPr/>
+          <a:lstStyle/>
+          <a:p>
+            <a:pPr lvl="0" marL="0" indent="0">
+              <a:buNone/>
+            </a:pPr>
+            <a:r>
+              <a:rPr/>
+              <a:t>Exponential</a:t>
+            </a:r>
+            <a:r>
+              <a:rPr/>
+              <a:t> </a:t>
+            </a:r>
+            <a:r>
+              <a:rPr/>
+              <a:t>Model:</a:t>
+            </a:r>
+            <a:r>
+              <a:rPr/>
+              <a:t> </a:t>
+            </a:r>
+            <a:r>
+              <a:rPr/>
+              <a:t>Accuracy</a:t>
+            </a:r>
+          </a:p>
+        </p:txBody>
+      </p:sp>
+      <p:sp>
+        <p:nvSpPr>
+          <p:cNvPr id="3" name="Content Placeholder 2"/>
+          <p:cNvSpPr>
+            <a:spLocks noGrp="1"/>
+          </p:cNvSpPr>
+          <p:nvPr>
+            <p:ph idx="1"/>
+          </p:nvPr>
+        </p:nvSpPr>
+        <p:spPr/>
+        <p:txBody>
+          <a:bodyPr/>
+          <a:lstStyle/>
+          <a:p>
+            <a:pPr lvl="0" marL="1270000" indent="0">
+              <a:buNone/>
+            </a:pPr>
+            <a:r>
+              <a:rPr sz="1800">
+                <a:latin typeface="Courier"/>
+              </a:rPr>
+              <a:t>##               ME   RMSE    MAE   MPE MAPE  ACF1 Theil's U
+## Test set -422488 522567 422488 -62.2 62.2 0.552      17.9</a:t>
+            </a:r>
+          </a:p>
+        </p:txBody>
+      </p:sp>
+    </p:spTree>
+  </p:cSld>
+</p:sld>
+</file>
+
 <file path=ppt/slides/slide14.xml><?xml version="1.0" encoding="utf-8"?>
 <p:sld xmlns:a="http://schemas.openxmlformats.org/drawingml/2006/main" xmlns:r="http://schemas.openxmlformats.org/officeDocument/2006/relationships" xmlns:p="http://schemas.openxmlformats.org/presentationml/2006/main">
   <p:cSld>
@@ -3737,7 +3734,7 @@
             </a:pPr>
             <a:r>
               <a:rPr/>
-              <a:t>Exponential</a:t>
+              <a:t>AR(1)</a:t>
             </a:r>
             <a:r>
               <a:rPr/>
@@ -3753,7 +3750,23 @@
             </a:r>
             <a:r>
               <a:rPr/>
-              <a:t>Accuracy</a:t>
+              <a:t>Random</a:t>
+            </a:r>
+            <a:r>
+              <a:rPr/>
+              <a:t> </a:t>
+            </a:r>
+            <a:r>
+              <a:rPr/>
+              <a:t>Walk</a:t>
+            </a:r>
+            <a:r>
+              <a:rPr/>
+              <a:t> </a:t>
+            </a:r>
+            <a:r>
+              <a:rPr/>
+              <a:t>Test</a:t>
             </a:r>
           </a:p>
         </p:txBody>
@@ -3773,6 +3786,20 @@
           <a:bodyPr/>
           <a:lstStyle/>
           <a:p>
+            <a:pPr lvl="1"/>
+            <a:r>
+              <a:rPr/>
+              <a:t>AR(1) model slope coefficient is within 1-2 standard errors of 1</a:t>
+            </a:r>
+          </a:p>
+          <a:p>
+            <a:pPr lvl="1"/>
+            <a:r>
+              <a:rPr/>
+              <a:t>Fails random walk test -&gt; stick to naive LM</a:t>
+            </a:r>
+          </a:p>
+          <a:p>
             <a:pPr lvl="0" marL="1270000" indent="0">
               <a:buNone/>
             </a:pPr>
@@ -3780,8 +3807,20 @@
               <a:rPr sz="1800">
                 <a:latin typeface="Courier"/>
               </a:rPr>
-              <a:t>##               ME   RMSE    MAE   MPE MAPE  ACF1 Theil's U
-## Test set -422488 522567 422488 -62.2 62.2 0.552      17.9</a:t>
+              <a:t>## Series: modelExp$residuals 
+## ARIMA(1,0,0) with non-zero mean 
+## 
+## Coefficients:
+##         ar1   mean
+##       0.974  0.221
+## s.e.  0.019  0.635
+## 
+## sigma^2 estimated as 0.043:  log likelihood=12.1
+## AIC=-18.1   AICc=-17.8   BIC=-10.9
+## 
+## Training set error measures:
+##                   ME  RMSE   MAE  MPE MAPE MASE    ACF1
+## Training set -0.0139 0.205 0.144 7.57 35.4    1 0.00862</a:t>
             </a:r>
           </a:p>
         </p:txBody>
@@ -3828,39 +3867,47 @@
             </a:pPr>
             <a:r>
               <a:rPr/>
-              <a:t>AR(1)</a:t>
-            </a:r>
-            <a:r>
-              <a:rPr/>
-              <a:t> </a:t>
-            </a:r>
-            <a:r>
-              <a:rPr/>
-              <a:t>Model:</a:t>
-            </a:r>
-            <a:r>
-              <a:rPr/>
-              <a:t> </a:t>
-            </a:r>
-            <a:r>
-              <a:rPr/>
-              <a:t>Random</a:t>
-            </a:r>
-            <a:r>
-              <a:rPr/>
-              <a:t> </a:t>
-            </a:r>
-            <a:r>
-              <a:rPr/>
-              <a:t>Walk</a:t>
-            </a:r>
-            <a:r>
-              <a:rPr/>
-              <a:t> </a:t>
-            </a:r>
-            <a:r>
-              <a:rPr/>
-              <a:t>Test</a:t>
+              <a:t>Part</a:t>
+            </a:r>
+            <a:r>
+              <a:rPr/>
+              <a:t> </a:t>
+            </a:r>
+            <a:r>
+              <a:rPr/>
+              <a:t>II:</a:t>
+            </a:r>
+            <a:r>
+              <a:rPr/>
+              <a:t> </a:t>
+            </a:r>
+            <a:r>
+              <a:rPr/>
+              <a:t>Impact</a:t>
+            </a:r>
+            <a:r>
+              <a:rPr/>
+              <a:t> </a:t>
+            </a:r>
+            <a:r>
+              <a:rPr/>
+              <a:t>on</a:t>
+            </a:r>
+            <a:r>
+              <a:rPr/>
+              <a:t> </a:t>
+            </a:r>
+            <a:r>
+              <a:rPr/>
+              <a:t>S&amp;P</a:t>
+            </a:r>
+            <a:r>
+              <a:rPr/>
+              <a:t> </a:t>
+            </a:r>
+            <a:r>
+              <a:rPr/>
+              <a:t>500</a:t>
             </a:r>
           </a:p>
         </p:txBody>
@@ -3880,20 +3927,6 @@
           <a:bodyPr/>
           <a:lstStyle/>
           <a:p>
-            <a:pPr lvl="1"/>
-            <a:r>
-              <a:rPr/>
-              <a:t>AR(1) model slope coefficient is within 1-2 standard errors of 1</a:t>
-            </a:r>
-          </a:p>
-          <a:p>
-            <a:pPr lvl="1"/>
-            <a:r>
-              <a:rPr/>
-              <a:t>Fails random walk test -&gt; stick to naive LM</a:t>
-            </a:r>
-          </a:p>
-          <a:p>
             <a:pPr lvl="0" marL="1270000" indent="0">
               <a:buNone/>
             </a:pPr>
@@ -3901,20 +3934,520 @@
               <a:rPr sz="1800">
                 <a:latin typeface="Courier"/>
               </a:rPr>
-              <a:t>## Series: modelExp$residuals 
-## ARIMA(1,0,0) with non-zero mean 
-## 
-## Coefficients:
-##         ar1   mean
-##       0.974  0.221
-## s.e.  0.019  0.635
-## 
-## sigma^2 estimated as 0.043:  log likelihood=12.1
-## AIC=-18.1   AICc=-17.8   BIC=-10.9
-## 
-## Training set error measures:
-##                   ME  RMSE   MAE  MPE MAPE MASE    ACF1
-## Training set -0.0139 0.205 0.144 7.57 35.4    1 0.00862</a:t>
+              <a:t>companies &lt;-</a:t>
+            </a:r>
+            <a:r>
+              <a:rPr sz="1800">
+                <a:solidFill>
+                  <a:srgbClr val="4070A0"/>
+                </a:solidFill>
+                <a:latin typeface="Courier"/>
+              </a:rPr>
+              <a:t> 'SPY'</a:t>
+            </a:r>
+            <a:br/>
+            <a:r>
+              <a:rPr sz="1800">
+                <a:latin typeface="Courier"/>
+              </a:rPr>
+              <a:t>begin &lt;-</a:t>
+            </a:r>
+            <a:r>
+              <a:rPr sz="1800">
+                <a:solidFill>
+                  <a:srgbClr val="4070A0"/>
+                </a:solidFill>
+                <a:latin typeface="Courier"/>
+              </a:rPr>
+              <a:t> </a:t>
+            </a:r>
+            <a:r>
+              <a:rPr sz="1800" b="1">
+                <a:solidFill>
+                  <a:srgbClr val="007020"/>
+                </a:solidFill>
+                <a:latin typeface="Courier"/>
+              </a:rPr>
+              <a:t>Sys.Date</a:t>
+            </a:r>
+            <a:r>
+              <a:rPr sz="1800">
+                <a:latin typeface="Courier"/>
+              </a:rPr>
+              <a:t>() </a:t>
+            </a:r>
+            <a:r>
+              <a:rPr sz="1800">
+                <a:solidFill>
+                  <a:srgbClr val="666666"/>
+                </a:solidFill>
+                <a:latin typeface="Courier"/>
+              </a:rPr>
+              <a:t>-</a:t>
+            </a:r>
+            <a:r>
+              <a:rPr sz="1800">
+                <a:solidFill>
+                  <a:srgbClr val="4070A0"/>
+                </a:solidFill>
+                <a:latin typeface="Courier"/>
+              </a:rPr>
+              <a:t> </a:t>
+            </a:r>
+            <a:r>
+              <a:rPr sz="1800">
+                <a:solidFill>
+                  <a:srgbClr val="40A070"/>
+                </a:solidFill>
+                <a:latin typeface="Courier"/>
+              </a:rPr>
+              <a:t>200</a:t>
+            </a:r>
+            <a:br/>
+            <a:r>
+              <a:rPr sz="1800">
+                <a:latin typeface="Courier"/>
+              </a:rPr>
+              <a:t>end &lt;-</a:t>
+            </a:r>
+            <a:r>
+              <a:rPr sz="1800">
+                <a:solidFill>
+                  <a:srgbClr val="4070A0"/>
+                </a:solidFill>
+                <a:latin typeface="Courier"/>
+              </a:rPr>
+              <a:t> </a:t>
+            </a:r>
+            <a:r>
+              <a:rPr sz="1800" b="1">
+                <a:solidFill>
+                  <a:srgbClr val="007020"/>
+                </a:solidFill>
+                <a:latin typeface="Courier"/>
+              </a:rPr>
+              <a:t>Sys.Date</a:t>
+            </a:r>
+            <a:r>
+              <a:rPr sz="1800">
+                <a:latin typeface="Courier"/>
+              </a:rPr>
+              <a:t>()</a:t>
+            </a:r>
+            <a:br/>
+            <a:br/>
+            <a:r>
+              <a:rPr sz="1800">
+                <a:latin typeface="Courier"/>
+              </a:rPr>
+              <a:t>stockData &lt;-</a:t>
+            </a:r>
+            <a:r>
+              <a:rPr sz="1800">
+                <a:solidFill>
+                  <a:srgbClr val="4070A0"/>
+                </a:solidFill>
+                <a:latin typeface="Courier"/>
+              </a:rPr>
+              <a:t> </a:t>
+            </a:r>
+            <a:r>
+              <a:rPr sz="1800" b="1">
+                <a:solidFill>
+                  <a:srgbClr val="007020"/>
+                </a:solidFill>
+                <a:latin typeface="Courier"/>
+              </a:rPr>
+              <a:t>BatchGetSymbols</a:t>
+            </a:r>
+            <a:r>
+              <a:rPr sz="1800">
+                <a:latin typeface="Courier"/>
+              </a:rPr>
+              <a:t>(</a:t>
+            </a:r>
+            <a:r>
+              <a:rPr sz="1800">
+                <a:solidFill>
+                  <a:srgbClr val="902000"/>
+                </a:solidFill>
+                <a:latin typeface="Courier"/>
+              </a:rPr>
+              <a:t>tickers =</a:t>
+            </a:r>
+            <a:r>
+              <a:rPr sz="1800">
+                <a:latin typeface="Courier"/>
+              </a:rPr>
+              <a:t> companies,</a:t>
+            </a:r>
+            <a:br/>
+            <a:r>
+              <a:rPr sz="1800">
+                <a:latin typeface="Courier"/>
+              </a:rPr>
+              <a:t>                             </a:t>
+            </a:r>
+            <a:r>
+              <a:rPr sz="1800">
+                <a:solidFill>
+                  <a:srgbClr val="902000"/>
+                </a:solidFill>
+                <a:latin typeface="Courier"/>
+              </a:rPr>
+              <a:t>first.date =</a:t>
+            </a:r>
+            <a:r>
+              <a:rPr sz="1800">
+                <a:latin typeface="Courier"/>
+              </a:rPr>
+              <a:t> begin,</a:t>
+            </a:r>
+            <a:br/>
+            <a:r>
+              <a:rPr sz="1800">
+                <a:latin typeface="Courier"/>
+              </a:rPr>
+              <a:t>                             </a:t>
+            </a:r>
+            <a:r>
+              <a:rPr sz="1800">
+                <a:solidFill>
+                  <a:srgbClr val="902000"/>
+                </a:solidFill>
+                <a:latin typeface="Courier"/>
+              </a:rPr>
+              <a:t>last.date =</a:t>
+            </a:r>
+            <a:r>
+              <a:rPr sz="1800">
+                <a:latin typeface="Courier"/>
+              </a:rPr>
+              <a:t> end,</a:t>
+            </a:r>
+            <a:br/>
+            <a:r>
+              <a:rPr sz="1800">
+                <a:latin typeface="Courier"/>
+              </a:rPr>
+              <a:t>                             </a:t>
+            </a:r>
+            <a:r>
+              <a:rPr sz="1800">
+                <a:solidFill>
+                  <a:srgbClr val="902000"/>
+                </a:solidFill>
+                <a:latin typeface="Courier"/>
+              </a:rPr>
+              <a:t>do.cache =</a:t>
+            </a:r>
+            <a:r>
+              <a:rPr sz="1800">
+                <a:latin typeface="Courier"/>
+              </a:rPr>
+              <a:t> </a:t>
+            </a:r>
+            <a:r>
+              <a:rPr sz="1800">
+                <a:solidFill>
+                  <a:srgbClr val="007020"/>
+                </a:solidFill>
+                <a:latin typeface="Courier"/>
+              </a:rPr>
+              <a:t>FALSE</a:t>
+            </a:r>
+            <a:r>
+              <a:rPr sz="1800">
+                <a:latin typeface="Courier"/>
+              </a:rPr>
+              <a:t>)</a:t>
+            </a:r>
+          </a:p>
+          <a:p>
+            <a:pPr lvl="0" marL="1270000" indent="0">
+              <a:buNone/>
+            </a:pPr>
+            <a:r>
+              <a:rPr sz="1800">
+                <a:latin typeface="Courier"/>
+              </a:rPr>
+              <a:t>## 
+## Running BatchGetSymbols for:
+##    tickers =SPY
+##    Downloading data for benchmark ticker
+## ^GSPC | yahoo (1|1)
+## SPY | yahoo (1|1) - Got 100% of valid prices | You got it!</a:t>
+            </a:r>
+          </a:p>
+          <a:p>
+            <a:pPr lvl="0" marL="1270000" indent="0">
+              <a:buNone/>
+            </a:pPr>
+            <a:r>
+              <a:rPr sz="1800">
+                <a:latin typeface="Courier"/>
+              </a:rPr>
+              <a:t>SPY &lt;-</a:t>
+            </a:r>
+            <a:r>
+              <a:rPr sz="1800">
+                <a:solidFill>
+                  <a:srgbClr val="4070A0"/>
+                </a:solidFill>
+                <a:latin typeface="Courier"/>
+              </a:rPr>
+              <a:t> </a:t>
+            </a:r>
+            <a:r>
+              <a:rPr sz="1800">
+                <a:latin typeface="Courier"/>
+              </a:rPr>
+              <a:t>stockData</a:t>
+            </a:r>
+            <a:r>
+              <a:rPr sz="1800">
+                <a:solidFill>
+                  <a:srgbClr val="666666"/>
+                </a:solidFill>
+                <a:latin typeface="Courier"/>
+              </a:rPr>
+              <a:t>$</a:t>
+            </a:r>
+            <a:r>
+              <a:rPr sz="1800">
+                <a:latin typeface="Courier"/>
+              </a:rPr>
+              <a:t>df.tickers </a:t>
+            </a:r>
+            <a:r>
+              <a:rPr sz="1800">
+                <a:solidFill>
+                  <a:srgbClr val="666666"/>
+                </a:solidFill>
+                <a:latin typeface="Courier"/>
+              </a:rPr>
+              <a:t>%&gt;%</a:t>
+            </a:r>
+            <a:br/>
+            <a:r>
+              <a:rPr sz="1800">
+                <a:solidFill>
+                  <a:srgbClr val="4070A0"/>
+                </a:solidFill>
+                <a:latin typeface="Courier"/>
+              </a:rPr>
+              <a:t>  </a:t>
+            </a:r>
+            <a:r>
+              <a:rPr sz="1800" b="1">
+                <a:solidFill>
+                  <a:srgbClr val="007020"/>
+                </a:solidFill>
+                <a:latin typeface="Courier"/>
+              </a:rPr>
+              <a:t>filter</a:t>
+            </a:r>
+            <a:r>
+              <a:rPr sz="1800">
+                <a:latin typeface="Courier"/>
+              </a:rPr>
+              <a:t>(ticker </a:t>
+            </a:r>
+            <a:r>
+              <a:rPr sz="1800">
+                <a:solidFill>
+                  <a:srgbClr val="666666"/>
+                </a:solidFill>
+                <a:latin typeface="Courier"/>
+              </a:rPr>
+              <a:t>==</a:t>
+            </a:r>
+            <a:r>
+              <a:rPr sz="1800">
+                <a:solidFill>
+                  <a:srgbClr val="4070A0"/>
+                </a:solidFill>
+                <a:latin typeface="Courier"/>
+              </a:rPr>
+              <a:t> "SPY"</a:t>
+            </a:r>
+            <a:r>
+              <a:rPr sz="1800">
+                <a:latin typeface="Courier"/>
+              </a:rPr>
+              <a:t>)</a:t>
+            </a:r>
+            <a:br/>
+            <a:r>
+              <a:rPr sz="1800" b="1">
+                <a:solidFill>
+                  <a:srgbClr val="007020"/>
+                </a:solidFill>
+                <a:latin typeface="Courier"/>
+              </a:rPr>
+              <a:t>head</a:t>
+            </a:r>
+            <a:r>
+              <a:rPr sz="1800">
+                <a:latin typeface="Courier"/>
+              </a:rPr>
+              <a:t>(SPY)</a:t>
+            </a:r>
+          </a:p>
+          <a:p>
+            <a:pPr lvl="0" marL="1270000" indent="0">
+              <a:buNone/>
+            </a:pPr>
+            <a:r>
+              <a:rPr sz="1800">
+                <a:latin typeface="Courier"/>
+              </a:rPr>
+              <a:t>##   price.open price.high price.low price.close   volume price.adjusted
+## 1        291        295       291         294 65091200            291
+## 2        293        295       293         293 59610500            290
+## 3        291        292       288         289 95708100            285
+## 4        291        292       290         291 62359400            288
+## 5        291        294       291         293 55296300            290
+## 6        296        299       296         296 98720400            293
+##     ref.date ticker ret.adjusted.prices ret.closing.prices
+## 1 2019-10-04    SPY                  NA                 NA
+## 2 2019-10-07    SPY            -0.00431           -0.00431
+## 3 2019-10-08    SPY            -0.01552           -0.01552
+## 4 2019-10-09    SPY             0.00950            0.00950
+## 5 2019-10-10    SPY             0.00676            0.00676
+## 6 2019-10-11    SPY             0.01037            0.01037</a:t>
+            </a:r>
+          </a:p>
+          <a:p>
+            <a:pPr lvl="0" marL="1270000" indent="0">
+              <a:buNone/>
+            </a:pPr>
+            <a:r>
+              <a:rPr sz="1800">
+                <a:latin typeface="Courier"/>
+              </a:rPr>
+              <a:t>preSPY &lt;-</a:t>
+            </a:r>
+            <a:r>
+              <a:rPr sz="1800">
+                <a:solidFill>
+                  <a:srgbClr val="4070A0"/>
+                </a:solidFill>
+                <a:latin typeface="Courier"/>
+              </a:rPr>
+              <a:t> </a:t>
+            </a:r>
+            <a:r>
+              <a:rPr sz="1800">
+                <a:latin typeface="Courier"/>
+              </a:rPr>
+              <a:t>SPY[</a:t>
+            </a:r>
+            <a:r>
+              <a:rPr sz="1800">
+                <a:solidFill>
+                  <a:srgbClr val="40A070"/>
+                </a:solidFill>
+                <a:latin typeface="Courier"/>
+              </a:rPr>
+              <a:t>1</a:t>
+            </a:r>
+            <a:r>
+              <a:rPr sz="1800">
+                <a:solidFill>
+                  <a:srgbClr val="666666"/>
+                </a:solidFill>
+                <a:latin typeface="Courier"/>
+              </a:rPr>
+              <a:t>:</a:t>
+            </a:r>
+            <a:r>
+              <a:rPr sz="1800">
+                <a:solidFill>
+                  <a:srgbClr val="40A070"/>
+                </a:solidFill>
+                <a:latin typeface="Courier"/>
+              </a:rPr>
+              <a:t>94</a:t>
+            </a:r>
+            <a:r>
+              <a:rPr sz="1800">
+                <a:latin typeface="Courier"/>
+              </a:rPr>
+              <a:t>, ] </a:t>
+            </a:r>
+            <a:r>
+              <a:rPr sz="1800" i="1">
+                <a:solidFill>
+                  <a:srgbClr val="60A0B0"/>
+                </a:solidFill>
+                <a:latin typeface="Courier"/>
+              </a:rPr>
+              <a:t># 90 bull market days leading to market high: Feb 19, 2020</a:t>
+            </a:r>
+            <a:br/>
+            <a:r>
+              <a:rPr sz="1800">
+                <a:latin typeface="Courier"/>
+              </a:rPr>
+              <a:t>postSPY &lt;-</a:t>
+            </a:r>
+            <a:r>
+              <a:rPr sz="1800">
+                <a:solidFill>
+                  <a:srgbClr val="4070A0"/>
+                </a:solidFill>
+                <a:latin typeface="Courier"/>
+              </a:rPr>
+              <a:t> </a:t>
+            </a:r>
+            <a:r>
+              <a:rPr sz="1800">
+                <a:latin typeface="Courier"/>
+              </a:rPr>
+              <a:t>SPY[</a:t>
+            </a:r>
+            <a:r>
+              <a:rPr sz="1800">
+                <a:solidFill>
+                  <a:srgbClr val="40A070"/>
+                </a:solidFill>
+                <a:latin typeface="Courier"/>
+              </a:rPr>
+              <a:t>95</a:t>
+            </a:r>
+            <a:r>
+              <a:rPr sz="1800">
+                <a:solidFill>
+                  <a:srgbClr val="666666"/>
+                </a:solidFill>
+                <a:latin typeface="Courier"/>
+              </a:rPr>
+              <a:t>:</a:t>
+            </a:r>
+            <a:r>
+              <a:rPr sz="1800">
+                <a:solidFill>
+                  <a:srgbClr val="40A070"/>
+                </a:solidFill>
+                <a:latin typeface="Courier"/>
+              </a:rPr>
+              <a:t>117</a:t>
+            </a:r>
+            <a:r>
+              <a:rPr sz="1800">
+                <a:latin typeface="Courier"/>
+              </a:rPr>
+              <a:t>, ] </a:t>
+            </a:r>
+            <a:r>
+              <a:rPr sz="1800" i="1">
+                <a:solidFill>
+                  <a:srgbClr val="60A0B0"/>
+                </a:solidFill>
+                <a:latin typeface="Courier"/>
+              </a:rPr>
+              <a:t># 22 bear market days following</a:t>
             </a:r>
           </a:p>
         </p:txBody>
@@ -3961,47 +4494,15 @@
             </a:pPr>
             <a:r>
               <a:rPr/>
-              <a:t>Part</a:t>
-            </a:r>
-            <a:r>
-              <a:rPr/>
-              <a:t> </a:t>
-            </a:r>
-            <a:r>
-              <a:rPr/>
-              <a:t>II:</a:t>
-            </a:r>
-            <a:r>
-              <a:rPr/>
-              <a:t> </a:t>
-            </a:r>
-            <a:r>
-              <a:rPr/>
-              <a:t>Impact</a:t>
-            </a:r>
-            <a:r>
-              <a:rPr/>
-              <a:t> </a:t>
-            </a:r>
-            <a:r>
-              <a:rPr/>
-              <a:t>on</a:t>
-            </a:r>
-            <a:r>
-              <a:rPr/>
-              <a:t> </a:t>
-            </a:r>
-            <a:r>
-              <a:rPr/>
-              <a:t>S&amp;P</a:t>
-            </a:r>
-            <a:r>
-              <a:rPr/>
-              <a:t> </a:t>
-            </a:r>
-            <a:r>
-              <a:rPr/>
-              <a:t>500</a:t>
+              <a:t>Quadratic</a:t>
+            </a:r>
+            <a:r>
+              <a:rPr/>
+              <a:t> </a:t>
+            </a:r>
+            <a:r>
+              <a:rPr/>
+              <a:t>Model</a:t>
             </a:r>
           </a:p>
         </p:txBody>
@@ -4025,10 +4526,20 @@
               <a:buNone/>
             </a:pPr>
             <a:r>
-              <a:rPr sz="1800">
-                <a:latin typeface="Courier"/>
-              </a:rPr>
-              <a:t>companies &lt;-</a:t>
+              <a:rPr sz="1800" i="1">
+                <a:solidFill>
+                  <a:srgbClr val="60A0B0"/>
+                </a:solidFill>
+                <a:latin typeface="Courier"/>
+              </a:rPr>
+              <a:t># Time series til Feb 19, 2020</a:t>
+            </a:r>
+            <a:br/>
+            <a:r>
+              <a:rPr sz="1800">
+                <a:latin typeface="Courier"/>
+              </a:rPr>
+              <a:t>SPYTS &lt;-</a:t>
             </a:r>
             <a:r>
               <a:rPr sz="1800">
@@ -4037,53 +4548,56 @@
                 </a:solidFill>
                 <a:latin typeface="Courier"/>
               </a:rPr>
-              <a:t> 'SPY'</a:t>
+              <a:t> </a:t>
+            </a:r>
+            <a:r>
+              <a:rPr sz="1800" b="1">
+                <a:solidFill>
+                  <a:srgbClr val="007020"/>
+                </a:solidFill>
+                <a:latin typeface="Courier"/>
+              </a:rPr>
+              <a:t>ts</a:t>
+            </a:r>
+            <a:r>
+              <a:rPr sz="1800">
+                <a:latin typeface="Courier"/>
+              </a:rPr>
+              <a:t>(preSPY</a:t>
+            </a:r>
+            <a:r>
+              <a:rPr sz="1800">
+                <a:solidFill>
+                  <a:srgbClr val="666666"/>
+                </a:solidFill>
+                <a:latin typeface="Courier"/>
+              </a:rPr>
+              <a:t>$</a:t>
+            </a:r>
+            <a:r>
+              <a:rPr sz="1800">
+                <a:latin typeface="Courier"/>
+              </a:rPr>
+              <a:t>price.close,</a:t>
             </a:r>
             <a:br/>
             <a:r>
               <a:rPr sz="1800">
                 <a:latin typeface="Courier"/>
               </a:rPr>
-              <a:t>begin &lt;-</a:t>
-            </a:r>
-            <a:r>
-              <a:rPr sz="1800">
-                <a:solidFill>
-                  <a:srgbClr val="4070A0"/>
-                </a:solidFill>
-                <a:latin typeface="Courier"/>
-              </a:rPr>
-              <a:t> </a:t>
-            </a:r>
-            <a:r>
-              <a:rPr sz="1800" b="1">
-                <a:solidFill>
-                  <a:srgbClr val="007020"/>
-                </a:solidFill>
-                <a:latin typeface="Courier"/>
-              </a:rPr>
-              <a:t>Sys.Date</a:t>
-            </a:r>
-            <a:r>
-              <a:rPr sz="1800">
-                <a:latin typeface="Courier"/>
-              </a:rPr>
-              <a:t>() </a:t>
-            </a:r>
-            <a:r>
-              <a:rPr sz="1800">
-                <a:solidFill>
-                  <a:srgbClr val="666666"/>
-                </a:solidFill>
-                <a:latin typeface="Courier"/>
-              </a:rPr>
-              <a:t>-</a:t>
-            </a:r>
-            <a:r>
-              <a:rPr sz="1800">
-                <a:solidFill>
-                  <a:srgbClr val="4070A0"/>
-                </a:solidFill>
+              <a:t>            </a:t>
+            </a:r>
+            <a:r>
+              <a:rPr sz="1800">
+                <a:solidFill>
+                  <a:srgbClr val="902000"/>
+                </a:solidFill>
+                <a:latin typeface="Courier"/>
+              </a:rPr>
+              <a:t>start =</a:t>
+            </a:r>
+            <a:r>
+              <a:rPr sz="1800">
                 <a:latin typeface="Courier"/>
               </a:rPr>
               <a:t> </a:t>
@@ -4095,38 +4609,87 @@
                 </a:solidFill>
                 <a:latin typeface="Courier"/>
               </a:rPr>
-              <a:t>200</a:t>
+              <a:t>1</a:t>
+            </a:r>
+            <a:r>
+              <a:rPr sz="1800">
+                <a:latin typeface="Courier"/>
+              </a:rPr>
+              <a:t>,</a:t>
             </a:r>
             <a:br/>
             <a:r>
               <a:rPr sz="1800">
                 <a:latin typeface="Courier"/>
               </a:rPr>
-              <a:t>end &lt;-</a:t>
-            </a:r>
-            <a:r>
-              <a:rPr sz="1800">
-                <a:solidFill>
-                  <a:srgbClr val="4070A0"/>
-                </a:solidFill>
-                <a:latin typeface="Courier"/>
-              </a:rPr>
-              <a:t> </a:t>
-            </a:r>
-            <a:r>
-              <a:rPr sz="1800" b="1">
-                <a:solidFill>
-                  <a:srgbClr val="007020"/>
-                </a:solidFill>
-                <a:latin typeface="Courier"/>
-              </a:rPr>
-              <a:t>Sys.Date</a:t>
-            </a:r>
-            <a:r>
-              <a:rPr sz="1800">
-                <a:latin typeface="Courier"/>
-              </a:rPr>
-              <a:t>()</a:t>
+              <a:t>            </a:t>
+            </a:r>
+            <a:r>
+              <a:rPr sz="1800">
+                <a:solidFill>
+                  <a:srgbClr val="902000"/>
+                </a:solidFill>
+                <a:latin typeface="Courier"/>
+              </a:rPr>
+              <a:t>end =</a:t>
+            </a:r>
+            <a:r>
+              <a:rPr sz="1800">
+                <a:latin typeface="Courier"/>
+              </a:rPr>
+              <a:t> </a:t>
+            </a:r>
+            <a:r>
+              <a:rPr sz="1800">
+                <a:solidFill>
+                  <a:srgbClr val="40A070"/>
+                </a:solidFill>
+                <a:latin typeface="Courier"/>
+              </a:rPr>
+              <a:t>94</a:t>
+            </a:r>
+            <a:r>
+              <a:rPr sz="1800">
+                <a:latin typeface="Courier"/>
+              </a:rPr>
+              <a:t>,</a:t>
+            </a:r>
+            <a:br/>
+            <a:r>
+              <a:rPr sz="1800">
+                <a:latin typeface="Courier"/>
+              </a:rPr>
+              <a:t>            </a:t>
+            </a:r>
+            <a:r>
+              <a:rPr sz="1800">
+                <a:solidFill>
+                  <a:srgbClr val="902000"/>
+                </a:solidFill>
+                <a:latin typeface="Courier"/>
+              </a:rPr>
+              <a:t>freq =</a:t>
+            </a:r>
+            <a:r>
+              <a:rPr sz="1800">
+                <a:latin typeface="Courier"/>
+              </a:rPr>
+              <a:t> </a:t>
+            </a:r>
+            <a:r>
+              <a:rPr sz="1800">
+                <a:solidFill>
+                  <a:srgbClr val="40A070"/>
+                </a:solidFill>
+                <a:latin typeface="Courier"/>
+              </a:rPr>
+              <a:t>1</a:t>
+            </a:r>
+            <a:r>
+              <a:rPr sz="1800">
+                <a:latin typeface="Courier"/>
+              </a:rPr>
+              <a:t>)</a:t>
             </a:r>
             <a:br/>
             <a:br/>
@@ -4134,7 +4697,7 @@
               <a:rPr sz="1800">
                 <a:latin typeface="Courier"/>
               </a:rPr>
-              <a:t>stockData &lt;-</a:t>
+              <a:t>postSPYTS &lt;-</a:t>
             </a:r>
             <a:r>
               <a:rPr sz="1800">
@@ -4152,13 +4715,35 @@
                 </a:solidFill>
                 <a:latin typeface="Courier"/>
               </a:rPr>
-              <a:t>BatchGetSymbols</a:t>
-            </a:r>
-            <a:r>
-              <a:rPr sz="1800">
-                <a:latin typeface="Courier"/>
-              </a:rPr>
-              <a:t>(</a:t>
+              <a:t>ts</a:t>
+            </a:r>
+            <a:r>
+              <a:rPr sz="1800">
+                <a:latin typeface="Courier"/>
+              </a:rPr>
+              <a:t>(postSPY</a:t>
+            </a:r>
+            <a:r>
+              <a:rPr sz="1800">
+                <a:solidFill>
+                  <a:srgbClr val="666666"/>
+                </a:solidFill>
+                <a:latin typeface="Courier"/>
+              </a:rPr>
+              <a:t>$</a:t>
+            </a:r>
+            <a:r>
+              <a:rPr sz="1800">
+                <a:latin typeface="Courier"/>
+              </a:rPr>
+              <a:t>price.close,</a:t>
+            </a:r>
+            <a:br/>
+            <a:r>
+              <a:rPr sz="1800">
+                <a:latin typeface="Courier"/>
+              </a:rPr>
+              <a:t>                   </a:t>
             </a:r>
             <a:r>
               <a:rPr sz="1800">
@@ -4167,20 +4752,35 @@
                 </a:solidFill>
                 <a:latin typeface="Courier"/>
               </a:rPr>
-              <a:t>tickers =</a:t>
-            </a:r>
-            <a:r>
-              <a:rPr sz="1800">
-                <a:latin typeface="Courier"/>
-              </a:rPr>
-              <a:t> companies,</a:t>
+              <a:t>start =</a:t>
+            </a:r>
+            <a:r>
+              <a:rPr sz="1800">
+                <a:latin typeface="Courier"/>
+              </a:rPr>
+              <a:t> </a:t>
+            </a:r>
+            <a:r>
+              <a:rPr sz="1800">
+                <a:solidFill>
+                  <a:srgbClr val="40A070"/>
+                </a:solidFill>
+                <a:latin typeface="Courier"/>
+              </a:rPr>
+              <a:t>95</a:t>
+            </a:r>
+            <a:r>
+              <a:rPr sz="1800">
+                <a:latin typeface="Courier"/>
+              </a:rPr>
+              <a:t>,</a:t>
             </a:r>
             <a:br/>
             <a:r>
               <a:rPr sz="1800">
                 <a:latin typeface="Courier"/>
               </a:rPr>
-              <a:t>                             </a:t>
+              <a:t>                   </a:t>
             </a:r>
             <a:r>
               <a:rPr sz="1800">
@@ -4189,20 +4789,35 @@
                 </a:solidFill>
                 <a:latin typeface="Courier"/>
               </a:rPr>
-              <a:t>first.date =</a:t>
-            </a:r>
-            <a:r>
-              <a:rPr sz="1800">
-                <a:latin typeface="Courier"/>
-              </a:rPr>
-              <a:t> begin,</a:t>
+              <a:t>end =</a:t>
+            </a:r>
+            <a:r>
+              <a:rPr sz="1800">
+                <a:latin typeface="Courier"/>
+              </a:rPr>
+              <a:t> </a:t>
+            </a:r>
+            <a:r>
+              <a:rPr sz="1800">
+                <a:solidFill>
+                  <a:srgbClr val="40A070"/>
+                </a:solidFill>
+                <a:latin typeface="Courier"/>
+              </a:rPr>
+              <a:t>117</a:t>
+            </a:r>
+            <a:r>
+              <a:rPr sz="1800">
+                <a:latin typeface="Courier"/>
+              </a:rPr>
+              <a:t>,</a:t>
             </a:r>
             <a:br/>
             <a:r>
               <a:rPr sz="1800">
                 <a:latin typeface="Courier"/>
               </a:rPr>
-              <a:t>                             </a:t>
+              <a:t>                </a:t>
             </a:r>
             <a:r>
               <a:rPr sz="1800">
@@ -4211,50 +4826,157 @@
                 </a:solidFill>
                 <a:latin typeface="Courier"/>
               </a:rPr>
-              <a:t>last.date =</a:t>
-            </a:r>
-            <a:r>
-              <a:rPr sz="1800">
-                <a:latin typeface="Courier"/>
-              </a:rPr>
-              <a:t> end,</a:t>
+              <a:t>freq =</a:t>
+            </a:r>
+            <a:r>
+              <a:rPr sz="1800">
+                <a:latin typeface="Courier"/>
+              </a:rPr>
+              <a:t> </a:t>
+            </a:r>
+            <a:r>
+              <a:rPr sz="1800">
+                <a:solidFill>
+                  <a:srgbClr val="40A070"/>
+                </a:solidFill>
+                <a:latin typeface="Courier"/>
+              </a:rPr>
+              <a:t>1</a:t>
+            </a:r>
+            <a:r>
+              <a:rPr sz="1800">
+                <a:latin typeface="Courier"/>
+              </a:rPr>
+              <a:t>)</a:t>
             </a:r>
             <a:br/>
-            <a:r>
-              <a:rPr sz="1800">
-                <a:latin typeface="Courier"/>
-              </a:rPr>
-              <a:t>                             </a:t>
-            </a:r>
-            <a:r>
-              <a:rPr sz="1800">
-                <a:solidFill>
-                  <a:srgbClr val="902000"/>
-                </a:solidFill>
-                <a:latin typeface="Courier"/>
-              </a:rPr>
-              <a:t>do.cache =</a:t>
-            </a:r>
-            <a:r>
-              <a:rPr sz="1800">
-                <a:latin typeface="Courier"/>
-              </a:rPr>
-              <a:t> </a:t>
-            </a:r>
-            <a:r>
-              <a:rPr sz="1800">
+            <a:br/>
+            <a:r>
+              <a:rPr sz="1800">
+                <a:latin typeface="Courier"/>
+              </a:rPr>
+              <a:t>SPYQuad &lt;-</a:t>
+            </a:r>
+            <a:r>
+              <a:rPr sz="1800">
+                <a:solidFill>
+                  <a:srgbClr val="4070A0"/>
+                </a:solidFill>
+                <a:latin typeface="Courier"/>
+              </a:rPr>
+              <a:t> </a:t>
+            </a:r>
+            <a:r>
+              <a:rPr sz="1800" b="1">
                 <a:solidFill>
                   <a:srgbClr val="007020"/>
                 </a:solidFill>
                 <a:latin typeface="Courier"/>
               </a:rPr>
-              <a:t>FALSE</a:t>
-            </a:r>
-            <a:r>
-              <a:rPr sz="1800">
-                <a:latin typeface="Courier"/>
-              </a:rPr>
-              <a:t>)</a:t>
+              <a:t>tslm</a:t>
+            </a:r>
+            <a:r>
+              <a:rPr sz="1800">
+                <a:latin typeface="Courier"/>
+              </a:rPr>
+              <a:t>(SPYTS </a:t>
+            </a:r>
+            <a:r>
+              <a:rPr sz="1800">
+                <a:solidFill>
+                  <a:srgbClr val="666666"/>
+                </a:solidFill>
+                <a:latin typeface="Courier"/>
+              </a:rPr>
+              <a:t>~</a:t>
+            </a:r>
+            <a:r>
+              <a:rPr sz="1800">
+                <a:solidFill>
+                  <a:srgbClr val="4070A0"/>
+                </a:solidFill>
+                <a:latin typeface="Courier"/>
+              </a:rPr>
+              <a:t> </a:t>
+            </a:r>
+            <a:r>
+              <a:rPr sz="1800">
+                <a:latin typeface="Courier"/>
+              </a:rPr>
+              <a:t>trend </a:t>
+            </a:r>
+            <a:r>
+              <a:rPr sz="1800">
+                <a:solidFill>
+                  <a:srgbClr val="666666"/>
+                </a:solidFill>
+                <a:latin typeface="Courier"/>
+              </a:rPr>
+              <a:t>+</a:t>
+            </a:r>
+            <a:r>
+              <a:rPr sz="1800">
+                <a:solidFill>
+                  <a:srgbClr val="4070A0"/>
+                </a:solidFill>
+                <a:latin typeface="Courier"/>
+              </a:rPr>
+              <a:t> </a:t>
+            </a:r>
+            <a:r>
+              <a:rPr sz="1800" b="1">
+                <a:solidFill>
+                  <a:srgbClr val="007020"/>
+                </a:solidFill>
+                <a:latin typeface="Courier"/>
+              </a:rPr>
+              <a:t>I</a:t>
+            </a:r>
+            <a:r>
+              <a:rPr sz="1800">
+                <a:latin typeface="Courier"/>
+              </a:rPr>
+              <a:t>(trend</a:t>
+            </a:r>
+            <a:r>
+              <a:rPr sz="1800">
+                <a:solidFill>
+                  <a:srgbClr val="666666"/>
+                </a:solidFill>
+                <a:latin typeface="Courier"/>
+              </a:rPr>
+              <a:t>^</a:t>
+            </a:r>
+            <a:r>
+              <a:rPr sz="1800">
+                <a:solidFill>
+                  <a:srgbClr val="40A070"/>
+                </a:solidFill>
+                <a:latin typeface="Courier"/>
+              </a:rPr>
+              <a:t>2</a:t>
+            </a:r>
+            <a:r>
+              <a:rPr sz="1800">
+                <a:latin typeface="Courier"/>
+              </a:rPr>
+              <a:t>))</a:t>
+            </a:r>
+            <a:br/>
+            <a:r>
+              <a:rPr sz="1800" b="1">
+                <a:solidFill>
+                  <a:srgbClr val="007020"/>
+                </a:solidFill>
+                <a:latin typeface="Courier"/>
+              </a:rPr>
+              <a:t>summary</a:t>
+            </a:r>
+            <a:r>
+              <a:rPr sz="1800">
+                <a:latin typeface="Courier"/>
+              </a:rPr>
+              <a:t>(SPYQuad)</a:t>
             </a:r>
           </a:p>
           <a:p>
@@ -4266,264 +4988,24 @@
                 <a:latin typeface="Courier"/>
               </a:rPr>
               <a:t>## 
-## Running BatchGetSymbols for:
-##    tickers =SPY
-##    Downloading data for benchmark ticker
-## ^GSPC | yahoo (1|1)
-## SPY | yahoo (1|1) - Got 100% of valid prices | Nice!</a:t>
-            </a:r>
-          </a:p>
-          <a:p>
-            <a:pPr lvl="0" marL="1270000" indent="0">
-              <a:buNone/>
-            </a:pPr>
-            <a:r>
-              <a:rPr sz="1800">
-                <a:latin typeface="Courier"/>
-              </a:rPr>
-              <a:t>SPY &lt;-</a:t>
-            </a:r>
-            <a:r>
-              <a:rPr sz="1800">
-                <a:solidFill>
-                  <a:srgbClr val="4070A0"/>
-                </a:solidFill>
-                <a:latin typeface="Courier"/>
-              </a:rPr>
-              <a:t> </a:t>
-            </a:r>
-            <a:r>
-              <a:rPr sz="1800">
-                <a:latin typeface="Courier"/>
-              </a:rPr>
-              <a:t>stockData</a:t>
-            </a:r>
-            <a:r>
-              <a:rPr sz="1800">
-                <a:solidFill>
-                  <a:srgbClr val="666666"/>
-                </a:solidFill>
-                <a:latin typeface="Courier"/>
-              </a:rPr>
-              <a:t>$</a:t>
-            </a:r>
-            <a:r>
-              <a:rPr sz="1800">
-                <a:latin typeface="Courier"/>
-              </a:rPr>
-              <a:t>df.tickers </a:t>
-            </a:r>
-            <a:r>
-              <a:rPr sz="1800">
-                <a:solidFill>
-                  <a:srgbClr val="666666"/>
-                </a:solidFill>
-                <a:latin typeface="Courier"/>
-              </a:rPr>
-              <a:t>%&gt;%</a:t>
-            </a:r>
-            <a:br/>
-            <a:r>
-              <a:rPr sz="1800">
-                <a:solidFill>
-                  <a:srgbClr val="4070A0"/>
-                </a:solidFill>
-                <a:latin typeface="Courier"/>
-              </a:rPr>
-              <a:t>  </a:t>
-            </a:r>
-            <a:r>
-              <a:rPr sz="1800" b="1">
-                <a:solidFill>
-                  <a:srgbClr val="007020"/>
-                </a:solidFill>
-                <a:latin typeface="Courier"/>
-              </a:rPr>
-              <a:t>filter</a:t>
-            </a:r>
-            <a:r>
-              <a:rPr sz="1800">
-                <a:latin typeface="Courier"/>
-              </a:rPr>
-              <a:t>(ticker </a:t>
-            </a:r>
-            <a:r>
-              <a:rPr sz="1800">
-                <a:solidFill>
-                  <a:srgbClr val="666666"/>
-                </a:solidFill>
-                <a:latin typeface="Courier"/>
-              </a:rPr>
-              <a:t>==</a:t>
-            </a:r>
-            <a:r>
-              <a:rPr sz="1800">
-                <a:solidFill>
-                  <a:srgbClr val="4070A0"/>
-                </a:solidFill>
-                <a:latin typeface="Courier"/>
-              </a:rPr>
-              <a:t> "SPY"</a:t>
-            </a:r>
-            <a:r>
-              <a:rPr sz="1800">
-                <a:latin typeface="Courier"/>
-              </a:rPr>
-              <a:t>)</a:t>
-            </a:r>
-            <a:br/>
-            <a:r>
-              <a:rPr sz="1800" b="1">
-                <a:solidFill>
-                  <a:srgbClr val="007020"/>
-                </a:solidFill>
-                <a:latin typeface="Courier"/>
-              </a:rPr>
-              <a:t>head</a:t>
-            </a:r>
-            <a:r>
-              <a:rPr sz="1800">
-                <a:latin typeface="Courier"/>
-              </a:rPr>
-              <a:t>(SPY)</a:t>
-            </a:r>
-          </a:p>
-          <a:p>
-            <a:pPr lvl="0" marL="1270000" indent="0">
-              <a:buNone/>
-            </a:pPr>
-            <a:r>
-              <a:rPr sz="1800">
-                <a:latin typeface="Courier"/>
-              </a:rPr>
-              <a:t>##   price.open price.high price.low price.close   volume price.adjusted
-## 1        291        295       291         294 65091200            291
-## 2        293        295       293         293 59610500            290
-## 3        291        292       288         289 95708100            285
-## 4        291        292       290         291 62359400            288
-## 5        291        294       291         293 55296300            290
-## 6        296        299       296         296 98720400            293
-##     ref.date ticker ret.adjusted.prices ret.closing.prices
-## 1 2019-10-04    SPY                  NA                 NA
-## 2 2019-10-07    SPY            -0.00431           -0.00431
-## 3 2019-10-08    SPY            -0.01552           -0.01552
-## 4 2019-10-09    SPY             0.00950            0.00950
-## 5 2019-10-10    SPY             0.00676            0.00676
-## 6 2019-10-11    SPY             0.01037            0.01037</a:t>
-            </a:r>
-          </a:p>
-          <a:p>
-            <a:pPr lvl="0" marL="1270000" indent="0">
-              <a:buNone/>
-            </a:pPr>
-            <a:r>
-              <a:rPr sz="1800">
-                <a:latin typeface="Courier"/>
-              </a:rPr>
-              <a:t>SPYTrain &lt;-</a:t>
-            </a:r>
-            <a:r>
-              <a:rPr sz="1800">
-                <a:solidFill>
-                  <a:srgbClr val="4070A0"/>
-                </a:solidFill>
-                <a:latin typeface="Courier"/>
-              </a:rPr>
-              <a:t> </a:t>
-            </a:r>
-            <a:r>
-              <a:rPr sz="1800">
-                <a:latin typeface="Courier"/>
-              </a:rPr>
-              <a:t>SPY[</a:t>
-            </a:r>
-            <a:r>
-              <a:rPr sz="1800">
-                <a:solidFill>
-                  <a:srgbClr val="40A070"/>
-                </a:solidFill>
-                <a:latin typeface="Courier"/>
-              </a:rPr>
-              <a:t>1</a:t>
-            </a:r>
-            <a:r>
-              <a:rPr sz="1800">
-                <a:solidFill>
-                  <a:srgbClr val="666666"/>
-                </a:solidFill>
-                <a:latin typeface="Courier"/>
-              </a:rPr>
-              <a:t>:</a:t>
-            </a:r>
-            <a:r>
-              <a:rPr sz="1800">
-                <a:solidFill>
-                  <a:srgbClr val="40A070"/>
-                </a:solidFill>
-                <a:latin typeface="Courier"/>
-              </a:rPr>
-              <a:t>97</a:t>
-            </a:r>
-            <a:r>
-              <a:rPr sz="1800">
-                <a:latin typeface="Courier"/>
-              </a:rPr>
-              <a:t>, ]</a:t>
-            </a:r>
-            <a:br/>
-            <a:r>
-              <a:rPr sz="1800">
-                <a:latin typeface="Courier"/>
-              </a:rPr>
-              <a:t>SPYValid &lt;-</a:t>
-            </a:r>
-            <a:r>
-              <a:rPr sz="1800">
-                <a:solidFill>
-                  <a:srgbClr val="4070A0"/>
-                </a:solidFill>
-                <a:latin typeface="Courier"/>
-              </a:rPr>
-              <a:t> </a:t>
-            </a:r>
-            <a:r>
-              <a:rPr sz="1800">
-                <a:latin typeface="Courier"/>
-              </a:rPr>
-              <a:t>SPY[</a:t>
-            </a:r>
-            <a:r>
-              <a:rPr sz="1800">
-                <a:solidFill>
-                  <a:srgbClr val="40A070"/>
-                </a:solidFill>
-                <a:latin typeface="Courier"/>
-              </a:rPr>
-              <a:t>98</a:t>
-            </a:r>
-            <a:r>
-              <a:rPr sz="1800">
-                <a:solidFill>
-                  <a:srgbClr val="666666"/>
-                </a:solidFill>
-                <a:latin typeface="Courier"/>
-              </a:rPr>
-              <a:t>:</a:t>
-            </a:r>
-            <a:r>
-              <a:rPr sz="1800">
-                <a:solidFill>
-                  <a:srgbClr val="40A070"/>
-                </a:solidFill>
-                <a:latin typeface="Courier"/>
-              </a:rPr>
-              <a:t>136</a:t>
-            </a:r>
-            <a:r>
-              <a:rPr sz="1800">
-                <a:latin typeface="Courier"/>
-              </a:rPr>
-              <a:t>, ]</a:t>
+## Call:
+## tslm(formula = SPYTS ~ trend + I(trend^2))
+## 
+## Residuals:
+##    Min     1Q Median     3Q    Max 
+## -9.400 -0.852  0.651  1.483  4.217 
+## 
+## Coefficients:
+##               Estimate Std. Error t value            Pr(&gt;|t|)    
+## (Intercept) 292.641126   0.778422  375.94 &lt;0.0000000000000002 ***
+## trend         0.572657   0.037821   15.14 &lt;0.0000000000000002 ***
+## I(trend^2)   -0.001260   0.000386   -3.27              0.0015 ** 
+## ---
+## Signif. codes:  0 '***' 0.001 '**' 0.01 '*' 0.05 '.' 0.1 ' ' 1
+## 
+## Residual standard error: 2.46 on 91 degrees of freedom
+## Multiple R-squared:  0.963,  Adjusted R-squared:  0.962 
+## F-statistic: 1.18e+03 on 2 and 91 DF,  p-value: &lt;0.0000000000000002</a:t>
             </a:r>
           </a:p>
         </p:txBody>
@@ -4534,684 +5016,6 @@
 </file>
 
 <file path=ppt/slides/slide17.xml><?xml version="1.0" encoding="utf-8"?>
-<p:sld xmlns:a="http://schemas.openxmlformats.org/drawingml/2006/main" xmlns:r="http://schemas.openxmlformats.org/officeDocument/2006/relationships" xmlns:p="http://schemas.openxmlformats.org/presentationml/2006/main">
-  <p:cSld>
-    <p:spTree>
-      <p:nvGrpSpPr>
-        <p:cNvPr id="1" name=""/>
-        <p:cNvGrpSpPr/>
-        <p:nvPr/>
-      </p:nvGrpSpPr>
-      <p:grpSpPr>
-        <a:xfrm>
-          <a:off x="0" y="0"/>
-          <a:ext cx="0" cy="0"/>
-          <a:chOff x="0" y="0"/>
-          <a:chExt cx="0" cy="0"/>
-        </a:xfrm>
-      </p:grpSpPr>
-      <p:sp>
-        <p:nvSpPr>
-          <p:cNvPr id="2" name="Title 1"/>
-          <p:cNvSpPr>
-            <a:spLocks noGrp="1"/>
-          </p:cNvSpPr>
-          <p:nvPr>
-            <p:ph type="title"/>
-          </p:nvPr>
-        </p:nvSpPr>
-        <p:spPr/>
-        <p:txBody>
-          <a:bodyPr/>
-          <a:lstStyle/>
-          <a:p>
-            <a:pPr lvl="0" marL="0" indent="0">
-              <a:buNone/>
-            </a:pPr>
-            <a:r>
-              <a:rPr/>
-              <a:t>Quadratic</a:t>
-            </a:r>
-            <a:r>
-              <a:rPr/>
-              <a:t> </a:t>
-            </a:r>
-            <a:r>
-              <a:rPr/>
-              <a:t>Model</a:t>
-            </a:r>
-          </a:p>
-        </p:txBody>
-      </p:sp>
-      <p:sp>
-        <p:nvSpPr>
-          <p:cNvPr id="3" name="Content Placeholder 2"/>
-          <p:cNvSpPr>
-            <a:spLocks noGrp="1"/>
-          </p:cNvSpPr>
-          <p:nvPr>
-            <p:ph idx="1"/>
-          </p:nvPr>
-        </p:nvSpPr>
-        <p:spPr/>
-        <p:txBody>
-          <a:bodyPr/>
-          <a:lstStyle/>
-          <a:p>
-            <a:pPr lvl="0" marL="1270000" indent="0">
-              <a:buNone/>
-            </a:pPr>
-            <a:r>
-              <a:rPr sz="1800" i="1">
-                <a:solidFill>
-                  <a:srgbClr val="60A0B0"/>
-                </a:solidFill>
-                <a:latin typeface="Courier"/>
-              </a:rPr>
-              <a:t># Time series til Feb 19, 2020</a:t>
-            </a:r>
-            <a:br/>
-            <a:r>
-              <a:rPr sz="1800">
-                <a:latin typeface="Courier"/>
-              </a:rPr>
-              <a:t>SPYTS &lt;-</a:t>
-            </a:r>
-            <a:r>
-              <a:rPr sz="1800">
-                <a:solidFill>
-                  <a:srgbClr val="4070A0"/>
-                </a:solidFill>
-                <a:latin typeface="Courier"/>
-              </a:rPr>
-              <a:t> </a:t>
-            </a:r>
-            <a:r>
-              <a:rPr sz="1800" b="1">
-                <a:solidFill>
-                  <a:srgbClr val="007020"/>
-                </a:solidFill>
-                <a:latin typeface="Courier"/>
-              </a:rPr>
-              <a:t>ts</a:t>
-            </a:r>
-            <a:r>
-              <a:rPr sz="1800">
-                <a:latin typeface="Courier"/>
-              </a:rPr>
-              <a:t>(SPYTrain</a:t>
-            </a:r>
-            <a:r>
-              <a:rPr sz="1800">
-                <a:solidFill>
-                  <a:srgbClr val="666666"/>
-                </a:solidFill>
-                <a:latin typeface="Courier"/>
-              </a:rPr>
-              <a:t>$</a:t>
-            </a:r>
-            <a:r>
-              <a:rPr sz="1800">
-                <a:latin typeface="Courier"/>
-              </a:rPr>
-              <a:t>price.close,</a:t>
-            </a:r>
-            <a:br/>
-            <a:r>
-              <a:rPr sz="1800">
-                <a:latin typeface="Courier"/>
-              </a:rPr>
-              <a:t>            </a:t>
-            </a:r>
-            <a:r>
-              <a:rPr sz="1800">
-                <a:solidFill>
-                  <a:srgbClr val="902000"/>
-                </a:solidFill>
-                <a:latin typeface="Courier"/>
-              </a:rPr>
-              <a:t>start =</a:t>
-            </a:r>
-            <a:r>
-              <a:rPr sz="1800">
-                <a:latin typeface="Courier"/>
-              </a:rPr>
-              <a:t> </a:t>
-            </a:r>
-            <a:r>
-              <a:rPr sz="1800" b="1">
-                <a:solidFill>
-                  <a:srgbClr val="007020"/>
-                </a:solidFill>
-                <a:latin typeface="Courier"/>
-              </a:rPr>
-              <a:t>c</a:t>
-            </a:r>
-            <a:r>
-              <a:rPr sz="1800">
-                <a:latin typeface="Courier"/>
-              </a:rPr>
-              <a:t>(</a:t>
-            </a:r>
-            <a:r>
-              <a:rPr sz="1800">
-                <a:solidFill>
-                  <a:srgbClr val="40A070"/>
-                </a:solidFill>
-                <a:latin typeface="Courier"/>
-              </a:rPr>
-              <a:t>2019</a:t>
-            </a:r>
-            <a:r>
-              <a:rPr sz="1800">
-                <a:latin typeface="Courier"/>
-              </a:rPr>
-              <a:t>, </a:t>
-            </a:r>
-            <a:r>
-              <a:rPr sz="1800">
-                <a:solidFill>
-                  <a:srgbClr val="40A070"/>
-                </a:solidFill>
-                <a:latin typeface="Courier"/>
-              </a:rPr>
-              <a:t>10</a:t>
-            </a:r>
-            <a:r>
-              <a:rPr sz="1800">
-                <a:latin typeface="Courier"/>
-              </a:rPr>
-              <a:t>),</a:t>
-            </a:r>
-            <a:br/>
-            <a:r>
-              <a:rPr sz="1800">
-                <a:latin typeface="Courier"/>
-              </a:rPr>
-              <a:t>            </a:t>
-            </a:r>
-            <a:r>
-              <a:rPr sz="1800">
-                <a:solidFill>
-                  <a:srgbClr val="902000"/>
-                </a:solidFill>
-                <a:latin typeface="Courier"/>
-              </a:rPr>
-              <a:t>end =</a:t>
-            </a:r>
-            <a:r>
-              <a:rPr sz="1800">
-                <a:latin typeface="Courier"/>
-              </a:rPr>
-              <a:t> </a:t>
-            </a:r>
-            <a:r>
-              <a:rPr sz="1800" b="1">
-                <a:solidFill>
-                  <a:srgbClr val="007020"/>
-                </a:solidFill>
-                <a:latin typeface="Courier"/>
-              </a:rPr>
-              <a:t>c</a:t>
-            </a:r>
-            <a:r>
-              <a:rPr sz="1800">
-                <a:latin typeface="Courier"/>
-              </a:rPr>
-              <a:t>(</a:t>
-            </a:r>
-            <a:r>
-              <a:rPr sz="1800">
-                <a:solidFill>
-                  <a:srgbClr val="40A070"/>
-                </a:solidFill>
-                <a:latin typeface="Courier"/>
-              </a:rPr>
-              <a:t>2020</a:t>
-            </a:r>
-            <a:r>
-              <a:rPr sz="1800">
-                <a:latin typeface="Courier"/>
-              </a:rPr>
-              <a:t>, </a:t>
-            </a:r>
-            <a:r>
-              <a:rPr sz="1800">
-                <a:solidFill>
-                  <a:srgbClr val="40A070"/>
-                </a:solidFill>
-                <a:latin typeface="Courier"/>
-              </a:rPr>
-              <a:t>02</a:t>
-            </a:r>
-            <a:r>
-              <a:rPr sz="1800">
-                <a:latin typeface="Courier"/>
-              </a:rPr>
-              <a:t>),</a:t>
-            </a:r>
-            <a:br/>
-            <a:r>
-              <a:rPr sz="1800">
-                <a:latin typeface="Courier"/>
-              </a:rPr>
-              <a:t>            </a:t>
-            </a:r>
-            <a:r>
-              <a:rPr sz="1800">
-                <a:solidFill>
-                  <a:srgbClr val="902000"/>
-                </a:solidFill>
-                <a:latin typeface="Courier"/>
-              </a:rPr>
-              <a:t>freq =</a:t>
-            </a:r>
-            <a:r>
-              <a:rPr sz="1800">
-                <a:latin typeface="Courier"/>
-              </a:rPr>
-              <a:t> </a:t>
-            </a:r>
-            <a:r>
-              <a:rPr sz="1800">
-                <a:solidFill>
-                  <a:srgbClr val="40A070"/>
-                </a:solidFill>
-                <a:latin typeface="Courier"/>
-              </a:rPr>
-              <a:t>97</a:t>
-            </a:r>
-            <a:r>
-              <a:rPr sz="1800">
-                <a:latin typeface="Courier"/>
-              </a:rPr>
-              <a:t>)</a:t>
-            </a:r>
-            <a:br/>
-            <a:br/>
-            <a:r>
-              <a:rPr sz="1800">
-                <a:latin typeface="Courier"/>
-              </a:rPr>
-              <a:t>SPYValidTS &lt;-</a:t>
-            </a:r>
-            <a:r>
-              <a:rPr sz="1800">
-                <a:solidFill>
-                  <a:srgbClr val="4070A0"/>
-                </a:solidFill>
-                <a:latin typeface="Courier"/>
-              </a:rPr>
-              <a:t> </a:t>
-            </a:r>
-            <a:r>
-              <a:rPr sz="1800" b="1">
-                <a:solidFill>
-                  <a:srgbClr val="007020"/>
-                </a:solidFill>
-                <a:latin typeface="Courier"/>
-              </a:rPr>
-              <a:t>ts</a:t>
-            </a:r>
-            <a:r>
-              <a:rPr sz="1800">
-                <a:latin typeface="Courier"/>
-              </a:rPr>
-              <a:t>(SPYValid</a:t>
-            </a:r>
-            <a:r>
-              <a:rPr sz="1800">
-                <a:solidFill>
-                  <a:srgbClr val="666666"/>
-                </a:solidFill>
-                <a:latin typeface="Courier"/>
-              </a:rPr>
-              <a:t>$</a:t>
-            </a:r>
-            <a:r>
-              <a:rPr sz="1800">
-                <a:latin typeface="Courier"/>
-              </a:rPr>
-              <a:t>price.close,</a:t>
-            </a:r>
-            <a:br/>
-            <a:r>
-              <a:rPr sz="1800">
-                <a:latin typeface="Courier"/>
-              </a:rPr>
-              <a:t>                   </a:t>
-            </a:r>
-            <a:r>
-              <a:rPr sz="1800">
-                <a:solidFill>
-                  <a:srgbClr val="902000"/>
-                </a:solidFill>
-                <a:latin typeface="Courier"/>
-              </a:rPr>
-              <a:t>start =</a:t>
-            </a:r>
-            <a:r>
-              <a:rPr sz="1800">
-                <a:latin typeface="Courier"/>
-              </a:rPr>
-              <a:t> </a:t>
-            </a:r>
-            <a:r>
-              <a:rPr sz="1800" b="1">
-                <a:solidFill>
-                  <a:srgbClr val="007020"/>
-                </a:solidFill>
-                <a:latin typeface="Courier"/>
-              </a:rPr>
-              <a:t>c</a:t>
-            </a:r>
-            <a:r>
-              <a:rPr sz="1800">
-                <a:latin typeface="Courier"/>
-              </a:rPr>
-              <a:t>(</a:t>
-            </a:r>
-            <a:r>
-              <a:rPr sz="1800">
-                <a:solidFill>
-                  <a:srgbClr val="40A070"/>
-                </a:solidFill>
-                <a:latin typeface="Courier"/>
-              </a:rPr>
-              <a:t>2020</a:t>
-            </a:r>
-            <a:r>
-              <a:rPr sz="1800">
-                <a:latin typeface="Courier"/>
-              </a:rPr>
-              <a:t>, </a:t>
-            </a:r>
-            <a:r>
-              <a:rPr sz="1800">
-                <a:solidFill>
-                  <a:srgbClr val="40A070"/>
-                </a:solidFill>
-                <a:latin typeface="Courier"/>
-              </a:rPr>
-              <a:t>02</a:t>
-            </a:r>
-            <a:r>
-              <a:rPr sz="1800">
-                <a:latin typeface="Courier"/>
-              </a:rPr>
-              <a:t>),</a:t>
-            </a:r>
-            <a:br/>
-            <a:r>
-              <a:rPr sz="1800">
-                <a:latin typeface="Courier"/>
-              </a:rPr>
-              <a:t>                   </a:t>
-            </a:r>
-            <a:r>
-              <a:rPr sz="1800">
-                <a:solidFill>
-                  <a:srgbClr val="902000"/>
-                </a:solidFill>
-                <a:latin typeface="Courier"/>
-              </a:rPr>
-              <a:t>end =</a:t>
-            </a:r>
-            <a:r>
-              <a:rPr sz="1800">
-                <a:latin typeface="Courier"/>
-              </a:rPr>
-              <a:t> </a:t>
-            </a:r>
-            <a:r>
-              <a:rPr sz="1800" b="1">
-                <a:solidFill>
-                  <a:srgbClr val="007020"/>
-                </a:solidFill>
-                <a:latin typeface="Courier"/>
-              </a:rPr>
-              <a:t>c</a:t>
-            </a:r>
-            <a:r>
-              <a:rPr sz="1800">
-                <a:latin typeface="Courier"/>
-              </a:rPr>
-              <a:t>(</a:t>
-            </a:r>
-            <a:r>
-              <a:rPr sz="1800">
-                <a:solidFill>
-                  <a:srgbClr val="40A070"/>
-                </a:solidFill>
-                <a:latin typeface="Courier"/>
-              </a:rPr>
-              <a:t>2020</a:t>
-            </a:r>
-            <a:r>
-              <a:rPr sz="1800">
-                <a:latin typeface="Courier"/>
-              </a:rPr>
-              <a:t>, </a:t>
-            </a:r>
-            <a:r>
-              <a:rPr sz="1800">
-                <a:solidFill>
-                  <a:srgbClr val="40A070"/>
-                </a:solidFill>
-                <a:latin typeface="Courier"/>
-              </a:rPr>
-              <a:t>04</a:t>
-            </a:r>
-            <a:r>
-              <a:rPr sz="1800">
-                <a:latin typeface="Courier"/>
-              </a:rPr>
-              <a:t>),</a:t>
-            </a:r>
-            <a:br/>
-            <a:r>
-              <a:rPr sz="1800">
-                <a:latin typeface="Courier"/>
-              </a:rPr>
-              <a:t>                   </a:t>
-            </a:r>
-            <a:r>
-              <a:rPr sz="1800">
-                <a:solidFill>
-                  <a:srgbClr val="902000"/>
-                </a:solidFill>
-                <a:latin typeface="Courier"/>
-              </a:rPr>
-              <a:t>freq =</a:t>
-            </a:r>
-            <a:r>
-              <a:rPr sz="1800">
-                <a:latin typeface="Courier"/>
-              </a:rPr>
-              <a:t> </a:t>
-            </a:r>
-            <a:r>
-              <a:rPr sz="1800">
-                <a:solidFill>
-                  <a:srgbClr val="40A070"/>
-                </a:solidFill>
-                <a:latin typeface="Courier"/>
-              </a:rPr>
-              <a:t>41</a:t>
-            </a:r>
-            <a:r>
-              <a:rPr sz="1800">
-                <a:latin typeface="Courier"/>
-              </a:rPr>
-              <a:t>)</a:t>
-            </a:r>
-            <a:br/>
-            <a:br/>
-            <a:r>
-              <a:rPr sz="1800">
-                <a:latin typeface="Courier"/>
-              </a:rPr>
-              <a:t>SPYQuad &lt;-</a:t>
-            </a:r>
-            <a:r>
-              <a:rPr sz="1800">
-                <a:solidFill>
-                  <a:srgbClr val="4070A0"/>
-                </a:solidFill>
-                <a:latin typeface="Courier"/>
-              </a:rPr>
-              <a:t> </a:t>
-            </a:r>
-            <a:r>
-              <a:rPr sz="1800" b="1">
-                <a:solidFill>
-                  <a:srgbClr val="007020"/>
-                </a:solidFill>
-                <a:latin typeface="Courier"/>
-              </a:rPr>
-              <a:t>tslm</a:t>
-            </a:r>
-            <a:r>
-              <a:rPr sz="1800">
-                <a:latin typeface="Courier"/>
-              </a:rPr>
-              <a:t>(SPYTS </a:t>
-            </a:r>
-            <a:r>
-              <a:rPr sz="1800">
-                <a:solidFill>
-                  <a:srgbClr val="666666"/>
-                </a:solidFill>
-                <a:latin typeface="Courier"/>
-              </a:rPr>
-              <a:t>~</a:t>
-            </a:r>
-            <a:r>
-              <a:rPr sz="1800">
-                <a:solidFill>
-                  <a:srgbClr val="4070A0"/>
-                </a:solidFill>
-                <a:latin typeface="Courier"/>
-              </a:rPr>
-              <a:t> </a:t>
-            </a:r>
-            <a:r>
-              <a:rPr sz="1800">
-                <a:latin typeface="Courier"/>
-              </a:rPr>
-              <a:t>trend </a:t>
-            </a:r>
-            <a:r>
-              <a:rPr sz="1800">
-                <a:solidFill>
-                  <a:srgbClr val="666666"/>
-                </a:solidFill>
-                <a:latin typeface="Courier"/>
-              </a:rPr>
-              <a:t>+</a:t>
-            </a:r>
-            <a:r>
-              <a:rPr sz="1800">
-                <a:solidFill>
-                  <a:srgbClr val="4070A0"/>
-                </a:solidFill>
-                <a:latin typeface="Courier"/>
-              </a:rPr>
-              <a:t> </a:t>
-            </a:r>
-            <a:r>
-              <a:rPr sz="1800" b="1">
-                <a:solidFill>
-                  <a:srgbClr val="007020"/>
-                </a:solidFill>
-                <a:latin typeface="Courier"/>
-              </a:rPr>
-              <a:t>I</a:t>
-            </a:r>
-            <a:r>
-              <a:rPr sz="1800">
-                <a:latin typeface="Courier"/>
-              </a:rPr>
-              <a:t>(trend</a:t>
-            </a:r>
-            <a:r>
-              <a:rPr sz="1800">
-                <a:solidFill>
-                  <a:srgbClr val="666666"/>
-                </a:solidFill>
-                <a:latin typeface="Courier"/>
-              </a:rPr>
-              <a:t>^</a:t>
-            </a:r>
-            <a:r>
-              <a:rPr sz="1800">
-                <a:solidFill>
-                  <a:srgbClr val="40A070"/>
-                </a:solidFill>
-                <a:latin typeface="Courier"/>
-              </a:rPr>
-              <a:t>2</a:t>
-            </a:r>
-            <a:r>
-              <a:rPr sz="1800">
-                <a:latin typeface="Courier"/>
-              </a:rPr>
-              <a:t>))</a:t>
-            </a:r>
-            <a:br/>
-            <a:r>
-              <a:rPr sz="1800" b="1">
-                <a:solidFill>
-                  <a:srgbClr val="007020"/>
-                </a:solidFill>
-                <a:latin typeface="Courier"/>
-              </a:rPr>
-              <a:t>summary</a:t>
-            </a:r>
-            <a:r>
-              <a:rPr sz="1800">
-                <a:latin typeface="Courier"/>
-              </a:rPr>
-              <a:t>(SPYQuad)</a:t>
-            </a:r>
-          </a:p>
-          <a:p>
-            <a:pPr lvl="0" marL="1270000" indent="0">
-              <a:buNone/>
-            </a:pPr>
-            <a:r>
-              <a:rPr sz="1800">
-                <a:latin typeface="Courier"/>
-              </a:rPr>
-              <a:t>## 
-## Call:
-## tslm(formula = SPYTS ~ trend + I(trend^2))
-## 
-## Residuals:
-##    Min     1Q Median     3Q    Max 
-## -8.671 -0.991  0.447  1.521  4.593 
-## 
-## Coefficients:
-##               Estimate Std. Error t value             Pr(&gt;|t|)    
-## (Intercept) 292.212939   0.783588  372.92 &lt; 0.0000000000000002 ***
-## trend         0.608868   0.039745   15.32 &lt; 0.0000000000000002 ***
-## I(trend^2)   -0.001746   0.000423   -4.13             0.000084 ***
-## ---
-## Signif. codes:  0 '***' 0.001 '**' 0.01 '*' 0.05 '.' 0.1 ' ' 1
-## 
-## Residual standard error: 2.42 on 87 degrees of freedom
-## Multiple R-squared:  0.96,   Adjusted R-squared:  0.96 
-## F-statistic: 1.06e+03 on 2 and 87 DF,  p-value: &lt;0.0000000000000002</a:t>
-            </a:r>
-          </a:p>
-        </p:txBody>
-      </p:sp>
-    </p:spTree>
-  </p:cSld>
-</p:sld>
-</file>
-
-<file path=ppt/slides/slide18.xml><?xml version="1.0" encoding="utf-8"?>
 <p:sld xmlns:a="http://schemas.openxmlformats.org/drawingml/2006/main" xmlns:r="http://schemas.openxmlformats.org/officeDocument/2006/relationships" xmlns:p="http://schemas.openxmlformats.org/presentationml/2006/main">
   <p:cSld>
     <p:spTree>
@@ -5323,315 +5127,6 @@
       </p:grpSpPr>
       <p:sp>
         <p:nvSpPr>
-          <p:cNvPr id="3" name="Content Placeholder 2"/>
-          <p:cNvSpPr>
-            <a:spLocks noGrp="1"/>
-          </p:cNvSpPr>
-          <p:nvPr>
-            <p:ph idx="1"/>
-          </p:nvPr>
-        </p:nvSpPr>
-        <p:spPr/>
-        <p:txBody>
-          <a:bodyPr/>
-          <a:lstStyle/>
-          <a:p>
-            <a:pPr lvl="0" marL="1270000" indent="0">
-              <a:buNone/>
-            </a:pPr>
-            <a:r>
-              <a:rPr sz="1800">
-                <a:latin typeface="Courier"/>
-              </a:rPr>
-              <a:t>## Warning: package 'tidyverse' was built under R version 3.6.3</a:t>
-            </a:r>
-          </a:p>
-          <a:p>
-            <a:pPr lvl="0" marL="1270000" indent="0">
-              <a:buNone/>
-            </a:pPr>
-            <a:r>
-              <a:rPr sz="1800">
-                <a:latin typeface="Courier"/>
-              </a:rPr>
-              <a:t>## -- Attaching packages ------------------------------------------------------------------------ tidyverse 1.3.0 --</a:t>
-            </a:r>
-          </a:p>
-          <a:p>
-            <a:pPr lvl="0" marL="1270000" indent="0">
-              <a:buNone/>
-            </a:pPr>
-            <a:r>
-              <a:rPr sz="1800">
-                <a:latin typeface="Courier"/>
-              </a:rPr>
-              <a:t>## v ggplot2 3.2.1     v purrr   0.3.3
-## v tibble  2.1.3     v dplyr   0.8.4
-## v tidyr   1.0.2     v stringr 1.4.0
-## v readr   1.3.1     v forcats 0.4.0</a:t>
-            </a:r>
-          </a:p>
-          <a:p>
-            <a:pPr lvl="0" marL="1270000" indent="0">
-              <a:buNone/>
-            </a:pPr>
-            <a:r>
-              <a:rPr sz="1800">
-                <a:latin typeface="Courier"/>
-              </a:rPr>
-              <a:t>## Warning: package 'stringr' was built under R version 3.6.3</a:t>
-            </a:r>
-          </a:p>
-          <a:p>
-            <a:pPr lvl="0" marL="1270000" indent="0">
-              <a:buNone/>
-            </a:pPr>
-            <a:r>
-              <a:rPr sz="1800">
-                <a:latin typeface="Courier"/>
-              </a:rPr>
-              <a:t>## -- Conflicts --------------------------------------------------------------------------- tidyverse_conflicts() --
-## x dplyr::filter() masks stats::filter()
-## x dplyr::lag()    masks stats::lag()</a:t>
-            </a:r>
-          </a:p>
-          <a:p>
-            <a:pPr lvl="0" marL="1270000" indent="0">
-              <a:buNone/>
-            </a:pPr>
-            <a:r>
-              <a:rPr sz="1800">
-                <a:latin typeface="Courier"/>
-              </a:rPr>
-              <a:t>## Warning: package 'forecast' was built under R version 3.6.3</a:t>
-            </a:r>
-          </a:p>
-          <a:p>
-            <a:pPr lvl="0" marL="1270000" indent="0">
-              <a:buNone/>
-            </a:pPr>
-            <a:r>
-              <a:rPr sz="1800">
-                <a:latin typeface="Courier"/>
-              </a:rPr>
-              <a:t>## Registered S3 method overwritten by 'quantmod':
-##   method            from
-##   as.zoo.data.frame zoo</a:t>
-            </a:r>
-          </a:p>
-          <a:p>
-            <a:pPr lvl="0" marL="1270000" indent="0">
-              <a:buNone/>
-            </a:pPr>
-            <a:r>
-              <a:rPr sz="1800">
-                <a:latin typeface="Courier"/>
-              </a:rPr>
-              <a:t>## Warning: package 'BatchGetSymbols' was built under R version 3.6.3</a:t>
-            </a:r>
-          </a:p>
-          <a:p>
-            <a:pPr lvl="0" marL="1270000" indent="0">
-              <a:buNone/>
-            </a:pPr>
-            <a:r>
-              <a:rPr sz="1800">
-                <a:latin typeface="Courier"/>
-              </a:rPr>
-              <a:t>## Loading required package: rvest</a:t>
-            </a:r>
-          </a:p>
-          <a:p>
-            <a:pPr lvl="0" marL="1270000" indent="0">
-              <a:buNone/>
-            </a:pPr>
-            <a:r>
-              <a:rPr sz="1800">
-                <a:latin typeface="Courier"/>
-              </a:rPr>
-              <a:t>## Warning: package 'rvest' was built under R version 3.6.3</a:t>
-            </a:r>
-          </a:p>
-          <a:p>
-            <a:pPr lvl="0" marL="1270000" indent="0">
-              <a:buNone/>
-            </a:pPr>
-            <a:r>
-              <a:rPr sz="1800">
-                <a:latin typeface="Courier"/>
-              </a:rPr>
-              <a:t>## Loading required package: xml2</a:t>
-            </a:r>
-          </a:p>
-          <a:p>
-            <a:pPr lvl="0" marL="1270000" indent="0">
-              <a:buNone/>
-            </a:pPr>
-            <a:r>
-              <a:rPr sz="1800">
-                <a:latin typeface="Courier"/>
-              </a:rPr>
-              <a:t>## 
-## Attaching package: 'rvest'</a:t>
-            </a:r>
-          </a:p>
-          <a:p>
-            <a:pPr lvl="0" marL="1270000" indent="0">
-              <a:buNone/>
-            </a:pPr>
-            <a:r>
-              <a:rPr sz="1800">
-                <a:latin typeface="Courier"/>
-              </a:rPr>
-              <a:t>## The following object is masked from 'package:purrr':
-## 
-##     pluck</a:t>
-            </a:r>
-          </a:p>
-          <a:p>
-            <a:pPr lvl="0" marL="1270000" indent="0">
-              <a:buNone/>
-            </a:pPr>
-            <a:r>
-              <a:rPr sz="1800">
-                <a:latin typeface="Courier"/>
-              </a:rPr>
-              <a:t>## The following object is masked from 'package:readr':
-## 
-##     guess_encoding</a:t>
-            </a:r>
-          </a:p>
-          <a:p>
-            <a:pPr lvl="0" marL="1270000" indent="0">
-              <a:buNone/>
-            </a:pPr>
-            <a:r>
-              <a:rPr sz="1800">
-                <a:latin typeface="Courier"/>
-              </a:rPr>
-              <a:t>## </a:t>
-            </a:r>
-          </a:p>
-          <a:p>
-            <a:pPr lvl="0" marL="1270000" indent="0">
-              <a:buNone/>
-            </a:pPr>
-            <a:r>
-              <a:rPr sz="1800">
-                <a:latin typeface="Courier"/>
-              </a:rPr>
-              <a:t>## Loading required package: xts</a:t>
-            </a:r>
-          </a:p>
-          <a:p>
-            <a:pPr lvl="0" marL="1270000" indent="0">
-              <a:buNone/>
-            </a:pPr>
-            <a:r>
-              <a:rPr sz="1800">
-                <a:latin typeface="Courier"/>
-              </a:rPr>
-              <a:t>## Loading required package: zoo</a:t>
-            </a:r>
-          </a:p>
-          <a:p>
-            <a:pPr lvl="0" marL="1270000" indent="0">
-              <a:buNone/>
-            </a:pPr>
-            <a:r>
-              <a:rPr sz="1800">
-                <a:latin typeface="Courier"/>
-              </a:rPr>
-              <a:t>## 
-## Attaching package: 'zoo'</a:t>
-            </a:r>
-          </a:p>
-          <a:p>
-            <a:pPr lvl="0" marL="1270000" indent="0">
-              <a:buNone/>
-            </a:pPr>
-            <a:r>
-              <a:rPr sz="1800">
-                <a:latin typeface="Courier"/>
-              </a:rPr>
-              <a:t>## The following objects are masked from 'package:base':
-## 
-##     as.Date, as.Date.numeric</a:t>
-            </a:r>
-          </a:p>
-          <a:p>
-            <a:pPr lvl="0" marL="1270000" indent="0">
-              <a:buNone/>
-            </a:pPr>
-            <a:r>
-              <a:rPr sz="1800">
-                <a:latin typeface="Courier"/>
-              </a:rPr>
-              <a:t>## 
-## Attaching package: 'xts'</a:t>
-            </a:r>
-          </a:p>
-          <a:p>
-            <a:pPr lvl="0" marL="1270000" indent="0">
-              <a:buNone/>
-            </a:pPr>
-            <a:r>
-              <a:rPr sz="1800">
-                <a:latin typeface="Courier"/>
-              </a:rPr>
-              <a:t>## The following objects are masked from 'package:dplyr':
-## 
-##     first, last</a:t>
-            </a:r>
-          </a:p>
-          <a:p>
-            <a:pPr lvl="0" marL="1270000" indent="0">
-              <a:buNone/>
-            </a:pPr>
-            <a:r>
-              <a:rPr sz="1800">
-                <a:latin typeface="Courier"/>
-              </a:rPr>
-              <a:t>## Loading required package: TTR</a:t>
-            </a:r>
-          </a:p>
-          <a:p>
-            <a:pPr lvl="0" marL="1270000" indent="0">
-              <a:buNone/>
-            </a:pPr>
-            <a:r>
-              <a:rPr sz="1800">
-                <a:latin typeface="Courier"/>
-              </a:rPr>
-              <a:t>## Version 0.4-0 included new data defaults. See ?getSymbols.</a:t>
-            </a:r>
-          </a:p>
-        </p:txBody>
-      </p:sp>
-    </p:spTree>
-  </p:cSld>
-</p:sld>
-</file>
-
-<file path=ppt/slides/slide3.xml><?xml version="1.0" encoding="utf-8"?>
-<p:sld xmlns:a="http://schemas.openxmlformats.org/drawingml/2006/main" xmlns:r="http://schemas.openxmlformats.org/officeDocument/2006/relationships" xmlns:p="http://schemas.openxmlformats.org/presentationml/2006/main">
-  <p:cSld>
-    <p:spTree>
-      <p:nvGrpSpPr>
-        <p:cNvPr id="1" name=""/>
-        <p:cNvGrpSpPr/>
-        <p:nvPr/>
-      </p:nvGrpSpPr>
-      <p:grpSpPr>
-        <a:xfrm>
-          <a:off x="0" y="0"/>
-          <a:ext cx="0" cy="0"/>
-          <a:chOff x="0" y="0"/>
-          <a:chExt cx="0" cy="0"/>
-        </a:xfrm>
-      </p:grpSpPr>
-      <p:sp>
-        <p:nvSpPr>
           <p:cNvPr id="2" name="Title 1"/>
           <p:cNvSpPr>
             <a:spLocks noGrp="1"/>
@@ -5722,6 +5217,450 @@
 </p:sld>
 </file>
 
+<file path=ppt/slides/slide3.xml><?xml version="1.0" encoding="utf-8"?>
+<p:sld xmlns:a="http://schemas.openxmlformats.org/drawingml/2006/main" xmlns:r="http://schemas.openxmlformats.org/officeDocument/2006/relationships" xmlns:p="http://schemas.openxmlformats.org/presentationml/2006/main">
+  <p:cSld>
+    <p:spTree>
+      <p:nvGrpSpPr>
+        <p:cNvPr id="1" name=""/>
+        <p:cNvGrpSpPr/>
+        <p:nvPr/>
+      </p:nvGrpSpPr>
+      <p:grpSpPr>
+        <a:xfrm>
+          <a:off x="0" y="0"/>
+          <a:ext cx="0" cy="0"/>
+          <a:chOff x="0" y="0"/>
+          <a:chExt cx="0" cy="0"/>
+        </a:xfrm>
+      </p:grpSpPr>
+      <p:sp>
+        <p:nvSpPr>
+          <p:cNvPr id="2" name="Title 1"/>
+          <p:cNvSpPr>
+            <a:spLocks noGrp="1"/>
+          </p:cNvSpPr>
+          <p:nvPr>
+            <p:ph type="title"/>
+          </p:nvPr>
+        </p:nvSpPr>
+        <p:spPr/>
+        <p:txBody>
+          <a:bodyPr/>
+          <a:lstStyle/>
+          <a:p>
+            <a:pPr lvl="0" marL="0" indent="0">
+              <a:buNone/>
+            </a:pPr>
+            <a:r>
+              <a:rPr/>
+              <a:t>U.S.</a:t>
+            </a:r>
+            <a:r>
+              <a:rPr/>
+              <a:t> </a:t>
+            </a:r>
+            <a:r>
+              <a:rPr/>
+              <a:t>Confirmed</a:t>
+            </a:r>
+            <a:r>
+              <a:rPr/>
+              <a:t> </a:t>
+            </a:r>
+            <a:r>
+              <a:rPr/>
+              <a:t>Cases</a:t>
+            </a:r>
+          </a:p>
+        </p:txBody>
+      </p:sp>
+      <p:sp>
+        <p:nvSpPr>
+          <p:cNvPr id="3" name="Content Placeholder 2"/>
+          <p:cNvSpPr>
+            <a:spLocks noGrp="1"/>
+          </p:cNvSpPr>
+          <p:nvPr>
+            <p:ph idx="1"/>
+          </p:nvPr>
+        </p:nvSpPr>
+        <p:spPr/>
+        <p:txBody>
+          <a:bodyPr/>
+          <a:lstStyle/>
+          <a:p>
+            <a:pPr lvl="0" marL="1270000" indent="0">
+              <a:buNone/>
+            </a:pPr>
+            <a:r>
+              <a:rPr sz="1800">
+                <a:latin typeface="Courier"/>
+              </a:rPr>
+              <a:t>corona &lt;-</a:t>
+            </a:r>
+            <a:r>
+              <a:rPr sz="1800">
+                <a:solidFill>
+                  <a:srgbClr val="4070A0"/>
+                </a:solidFill>
+                <a:latin typeface="Courier"/>
+              </a:rPr>
+              <a:t> </a:t>
+            </a:r>
+            <a:r>
+              <a:rPr sz="1800">
+                <a:latin typeface="Courier"/>
+              </a:rPr>
+              <a:t>coronavirus </a:t>
+            </a:r>
+            <a:r>
+              <a:rPr sz="1800">
+                <a:solidFill>
+                  <a:srgbClr val="666666"/>
+                </a:solidFill>
+                <a:latin typeface="Courier"/>
+              </a:rPr>
+              <a:t>%&gt;%</a:t>
+            </a:r>
+            <a:br/>
+            <a:r>
+              <a:rPr sz="1800">
+                <a:solidFill>
+                  <a:srgbClr val="4070A0"/>
+                </a:solidFill>
+                <a:latin typeface="Courier"/>
+              </a:rPr>
+              <a:t>  </a:t>
+            </a:r>
+            <a:r>
+              <a:rPr sz="1800" b="1">
+                <a:solidFill>
+                  <a:srgbClr val="007020"/>
+                </a:solidFill>
+                <a:latin typeface="Courier"/>
+              </a:rPr>
+              <a:t>filter</a:t>
+            </a:r>
+            <a:r>
+              <a:rPr sz="1800">
+                <a:latin typeface="Courier"/>
+              </a:rPr>
+              <a:t>(Country.Region </a:t>
+            </a:r>
+            <a:r>
+              <a:rPr sz="1800">
+                <a:solidFill>
+                  <a:srgbClr val="666666"/>
+                </a:solidFill>
+                <a:latin typeface="Courier"/>
+              </a:rPr>
+              <a:t>==</a:t>
+            </a:r>
+            <a:r>
+              <a:rPr sz="1800">
+                <a:solidFill>
+                  <a:srgbClr val="4070A0"/>
+                </a:solidFill>
+                <a:latin typeface="Courier"/>
+              </a:rPr>
+              <a:t> "US"</a:t>
+            </a:r>
+            <a:r>
+              <a:rPr sz="1800">
+                <a:latin typeface="Courier"/>
+              </a:rPr>
+              <a:t>) </a:t>
+            </a:r>
+            <a:r>
+              <a:rPr sz="1800">
+                <a:solidFill>
+                  <a:srgbClr val="666666"/>
+                </a:solidFill>
+                <a:latin typeface="Courier"/>
+              </a:rPr>
+              <a:t>%&gt;%</a:t>
+            </a:r>
+            <a:br/>
+            <a:r>
+              <a:rPr sz="1800">
+                <a:solidFill>
+                  <a:srgbClr val="4070A0"/>
+                </a:solidFill>
+                <a:latin typeface="Courier"/>
+              </a:rPr>
+              <a:t>  </a:t>
+            </a:r>
+            <a:r>
+              <a:rPr sz="1800" b="1">
+                <a:solidFill>
+                  <a:srgbClr val="007020"/>
+                </a:solidFill>
+                <a:latin typeface="Courier"/>
+              </a:rPr>
+              <a:t>filter</a:t>
+            </a:r>
+            <a:r>
+              <a:rPr sz="1800">
+                <a:latin typeface="Courier"/>
+              </a:rPr>
+              <a:t>(type </a:t>
+            </a:r>
+            <a:r>
+              <a:rPr sz="1800">
+                <a:solidFill>
+                  <a:srgbClr val="666666"/>
+                </a:solidFill>
+                <a:latin typeface="Courier"/>
+              </a:rPr>
+              <a:t>==</a:t>
+            </a:r>
+            <a:r>
+              <a:rPr sz="1800">
+                <a:solidFill>
+                  <a:srgbClr val="4070A0"/>
+                </a:solidFill>
+                <a:latin typeface="Courier"/>
+              </a:rPr>
+              <a:t> "confirmed"</a:t>
+            </a:r>
+            <a:r>
+              <a:rPr sz="1800">
+                <a:latin typeface="Courier"/>
+              </a:rPr>
+              <a:t>)</a:t>
+            </a:r>
+            <a:br/>
+            <a:br/>
+            <a:r>
+              <a:rPr sz="1800">
+                <a:latin typeface="Courier"/>
+              </a:rPr>
+              <a:t>coronaCases &lt;-</a:t>
+            </a:r>
+            <a:r>
+              <a:rPr sz="1800">
+                <a:solidFill>
+                  <a:srgbClr val="4070A0"/>
+                </a:solidFill>
+                <a:latin typeface="Courier"/>
+              </a:rPr>
+              <a:t> </a:t>
+            </a:r>
+            <a:r>
+              <a:rPr sz="1800">
+                <a:latin typeface="Courier"/>
+              </a:rPr>
+              <a:t>corona[, </a:t>
+            </a:r>
+            <a:r>
+              <a:rPr sz="1800" b="1">
+                <a:solidFill>
+                  <a:srgbClr val="007020"/>
+                </a:solidFill>
+                <a:latin typeface="Courier"/>
+              </a:rPr>
+              <a:t>c</a:t>
+            </a:r>
+            <a:r>
+              <a:rPr sz="1800">
+                <a:latin typeface="Courier"/>
+              </a:rPr>
+              <a:t>(</a:t>
+            </a:r>
+            <a:r>
+              <a:rPr sz="1800">
+                <a:solidFill>
+                  <a:srgbClr val="40A070"/>
+                </a:solidFill>
+                <a:latin typeface="Courier"/>
+              </a:rPr>
+              <a:t>5</a:t>
+            </a:r>
+            <a:r>
+              <a:rPr sz="1800">
+                <a:latin typeface="Courier"/>
+              </a:rPr>
+              <a:t>, </a:t>
+            </a:r>
+            <a:r>
+              <a:rPr sz="1800">
+                <a:solidFill>
+                  <a:srgbClr val="40A070"/>
+                </a:solidFill>
+                <a:latin typeface="Courier"/>
+              </a:rPr>
+              <a:t>6</a:t>
+            </a:r>
+            <a:r>
+              <a:rPr sz="1800">
+                <a:latin typeface="Courier"/>
+              </a:rPr>
+              <a:t>)]</a:t>
+            </a:r>
+            <a:br/>
+            <a:br/>
+            <a:r>
+              <a:rPr sz="1800">
+                <a:latin typeface="Courier"/>
+              </a:rPr>
+              <a:t>coronaTotal &lt;-</a:t>
+            </a:r>
+            <a:r>
+              <a:rPr sz="1800">
+                <a:solidFill>
+                  <a:srgbClr val="4070A0"/>
+                </a:solidFill>
+                <a:latin typeface="Courier"/>
+              </a:rPr>
+              <a:t> </a:t>
+            </a:r>
+            <a:r>
+              <a:rPr sz="1800">
+                <a:latin typeface="Courier"/>
+              </a:rPr>
+              <a:t>coronaCases </a:t>
+            </a:r>
+            <a:r>
+              <a:rPr sz="1800">
+                <a:solidFill>
+                  <a:srgbClr val="666666"/>
+                </a:solidFill>
+                <a:latin typeface="Courier"/>
+              </a:rPr>
+              <a:t>%&gt;%</a:t>
+            </a:r>
+            <a:br/>
+            <a:r>
+              <a:rPr sz="1800">
+                <a:solidFill>
+                  <a:srgbClr val="4070A0"/>
+                </a:solidFill>
+                <a:latin typeface="Courier"/>
+              </a:rPr>
+              <a:t>  </a:t>
+            </a:r>
+            <a:r>
+              <a:rPr sz="1800" b="1">
+                <a:solidFill>
+                  <a:srgbClr val="007020"/>
+                </a:solidFill>
+                <a:latin typeface="Courier"/>
+              </a:rPr>
+              <a:t>mutate</a:t>
+            </a:r>
+            <a:r>
+              <a:rPr sz="1800">
+                <a:latin typeface="Courier"/>
+              </a:rPr>
+              <a:t>(</a:t>
+            </a:r>
+            <a:r>
+              <a:rPr sz="1800">
+                <a:solidFill>
+                  <a:srgbClr val="902000"/>
+                </a:solidFill>
+                <a:latin typeface="Courier"/>
+              </a:rPr>
+              <a:t>total =</a:t>
+            </a:r>
+            <a:r>
+              <a:rPr sz="1800">
+                <a:latin typeface="Courier"/>
+              </a:rPr>
+              <a:t> </a:t>
+            </a:r>
+            <a:r>
+              <a:rPr sz="1800" b="1">
+                <a:solidFill>
+                  <a:srgbClr val="007020"/>
+                </a:solidFill>
+                <a:latin typeface="Courier"/>
+              </a:rPr>
+              <a:t>cumsum</a:t>
+            </a:r>
+            <a:r>
+              <a:rPr sz="1800">
+                <a:latin typeface="Courier"/>
+              </a:rPr>
+              <a:t>(cases))</a:t>
+            </a:r>
+            <a:br/>
+            <a:br/>
+            <a:r>
+              <a:rPr sz="1800">
+                <a:latin typeface="Courier"/>
+              </a:rPr>
+              <a:t>coronaTotal[</a:t>
+            </a:r>
+            <a:r>
+              <a:rPr sz="1800">
+                <a:solidFill>
+                  <a:srgbClr val="40A070"/>
+                </a:solidFill>
+                <a:latin typeface="Courier"/>
+              </a:rPr>
+              <a:t>82</a:t>
+            </a:r>
+            <a:r>
+              <a:rPr sz="1800">
+                <a:solidFill>
+                  <a:srgbClr val="666666"/>
+                </a:solidFill>
+                <a:latin typeface="Courier"/>
+              </a:rPr>
+              <a:t>:</a:t>
+            </a:r>
+            <a:r>
+              <a:rPr sz="1800">
+                <a:solidFill>
+                  <a:srgbClr val="40A070"/>
+                </a:solidFill>
+                <a:latin typeface="Courier"/>
+              </a:rPr>
+              <a:t>88</a:t>
+            </a:r>
+            <a:r>
+              <a:rPr sz="1800">
+                <a:latin typeface="Courier"/>
+              </a:rPr>
+              <a:t>, ] </a:t>
+            </a:r>
+            <a:r>
+              <a:rPr sz="1800" i="1">
+                <a:solidFill>
+                  <a:srgbClr val="60A0B0"/>
+                </a:solidFill>
+                <a:latin typeface="Courier"/>
+              </a:rPr>
+              <a:t># Validation set</a:t>
+            </a:r>
+          </a:p>
+          <a:p>
+            <a:pPr lvl="0" marL="1270000" indent="0">
+              <a:buNone/>
+            </a:pPr>
+            <a:r>
+              <a:rPr sz="1800">
+                <a:latin typeface="Courier"/>
+              </a:rPr>
+              <a:t>##          date cases  total
+## 82 2020-04-12 28917 555313
+## 83 2020-04-13 25306 580619
+## 84 2020-04-14 27051 607670
+## 85 2020-04-15 28680 636350
+## 86 2020-04-16 31451 667801
+## 87 2020-04-17 31905 699706
+## 88 2020-04-18 32491 732197</a:t>
+            </a:r>
+          </a:p>
+        </p:txBody>
+      </p:sp>
+    </p:spTree>
+  </p:cSld>
+</p:sld>
+</file>
+
 <file path=ppt/slides/slide4.xml><?xml version="1.0" encoding="utf-8"?>
 <p:sld xmlns:a="http://schemas.openxmlformats.org/drawingml/2006/main" xmlns:r="http://schemas.openxmlformats.org/officeDocument/2006/relationships" xmlns:p="http://schemas.openxmlformats.org/presentationml/2006/main">
   <p:cSld>
@@ -5759,23 +5698,15 @@
             </a:pPr>
             <a:r>
               <a:rPr/>
-              <a:t>U.S.</a:t>
-            </a:r>
-            <a:r>
-              <a:rPr/>
-              <a:t> </a:t>
-            </a:r>
-            <a:r>
-              <a:rPr/>
-              <a:t>Confirmed</a:t>
-            </a:r>
-            <a:r>
-              <a:rPr/>
-              <a:t> </a:t>
-            </a:r>
-            <a:r>
-              <a:rPr/>
-              <a:t>Cases</a:t>
+              <a:t>Time</a:t>
+            </a:r>
+            <a:r>
+              <a:rPr/>
+              <a:t> </a:t>
+            </a:r>
+            <a:r>
+              <a:rPr/>
+              <a:t>Series</a:t>
             </a:r>
           </a:p>
         </p:txBody>
@@ -5802,7 +5733,7 @@
               <a:rPr sz="1800">
                 <a:latin typeface="Courier"/>
               </a:rPr>
-              <a:t>corona &lt;-</a:t>
+              <a:t>coronaTrain &lt;-</a:t>
             </a:r>
             <a:r>
               <a:rPr sz="1800">
@@ -5817,7 +5748,16 @@
               <a:rPr sz="1800">
                 <a:latin typeface="Courier"/>
               </a:rPr>
-              <a:t>coronavirus </a:t>
+              <a:t>coronaTotal[</a:t>
+            </a:r>
+            <a:r>
+              <a:rPr sz="1800">
+                <a:solidFill>
+                  <a:srgbClr val="40A070"/>
+                </a:solidFill>
+                <a:latin typeface="Courier"/>
+              </a:rPr>
+              <a:t>1</a:t>
             </a:r>
             <a:r>
               <a:rPr sz="1800">
@@ -5826,32 +5766,53 @@
                 </a:solidFill>
                 <a:latin typeface="Courier"/>
               </a:rPr>
-              <a:t>%&gt;%</a:t>
+              <a:t>:</a:t>
+            </a:r>
+            <a:r>
+              <a:rPr sz="1800">
+                <a:solidFill>
+                  <a:srgbClr val="40A070"/>
+                </a:solidFill>
+                <a:latin typeface="Courier"/>
+              </a:rPr>
+              <a:t>81</a:t>
+            </a:r>
+            <a:r>
+              <a:rPr sz="1800">
+                <a:latin typeface="Courier"/>
+              </a:rPr>
+              <a:t>, ]</a:t>
             </a:r>
             <a:br/>
             <a:r>
               <a:rPr sz="1800">
+                <a:latin typeface="Courier"/>
+              </a:rPr>
+              <a:t>coronaValid &lt;-</a:t>
+            </a:r>
+            <a:r>
+              <a:rPr sz="1800">
                 <a:solidFill>
                   <a:srgbClr val="4070A0"/>
                 </a:solidFill>
                 <a:latin typeface="Courier"/>
               </a:rPr>
-              <a:t>  </a:t>
-            </a:r>
-            <a:r>
-              <a:rPr sz="1800" b="1">
-                <a:solidFill>
-                  <a:srgbClr val="007020"/>
-                </a:solidFill>
-                <a:latin typeface="Courier"/>
-              </a:rPr>
-              <a:t>filter</a:t>
-            </a:r>
-            <a:r>
-              <a:rPr sz="1800">
-                <a:latin typeface="Courier"/>
-              </a:rPr>
-              <a:t>(Country.Region </a:t>
+              <a:t> </a:t>
+            </a:r>
+            <a:r>
+              <a:rPr sz="1800">
+                <a:latin typeface="Courier"/>
+              </a:rPr>
+              <a:t>coronaTotal[</a:t>
+            </a:r>
+            <a:r>
+              <a:rPr sz="1800">
+                <a:solidFill>
+                  <a:srgbClr val="40A070"/>
+                </a:solidFill>
+                <a:latin typeface="Courier"/>
+              </a:rPr>
+              <a:t>82</a:t>
             </a:r>
             <a:r>
               <a:rPr sz="1800">
@@ -5860,80 +5821,22 @@
                 </a:solidFill>
                 <a:latin typeface="Courier"/>
               </a:rPr>
-              <a:t>==</a:t>
-            </a:r>
-            <a:r>
-              <a:rPr sz="1800">
-                <a:solidFill>
-                  <a:srgbClr val="4070A0"/>
-                </a:solidFill>
-                <a:latin typeface="Courier"/>
-              </a:rPr>
-              <a:t> "US"</a:t>
-            </a:r>
-            <a:r>
-              <a:rPr sz="1800">
-                <a:latin typeface="Courier"/>
-              </a:rPr>
-              <a:t>) </a:t>
-            </a:r>
-            <a:r>
-              <a:rPr sz="1800">
-                <a:solidFill>
-                  <a:srgbClr val="666666"/>
-                </a:solidFill>
-                <a:latin typeface="Courier"/>
-              </a:rPr>
-              <a:t>%&gt;%</a:t>
-            </a:r>
-            <a:br/>
-            <a:r>
-              <a:rPr sz="1800">
-                <a:solidFill>
-                  <a:srgbClr val="4070A0"/>
-                </a:solidFill>
-                <a:latin typeface="Courier"/>
-              </a:rPr>
-              <a:t>  </a:t>
-            </a:r>
-            <a:r>
-              <a:rPr sz="1800" b="1">
-                <a:solidFill>
-                  <a:srgbClr val="007020"/>
-                </a:solidFill>
-                <a:latin typeface="Courier"/>
-              </a:rPr>
-              <a:t>filter</a:t>
-            </a:r>
-            <a:r>
-              <a:rPr sz="1800">
-                <a:latin typeface="Courier"/>
-              </a:rPr>
-              <a:t>(type </a:t>
-            </a:r>
-            <a:r>
-              <a:rPr sz="1800">
-                <a:solidFill>
-                  <a:srgbClr val="666666"/>
-                </a:solidFill>
-                <a:latin typeface="Courier"/>
-              </a:rPr>
-              <a:t>==</a:t>
-            </a:r>
-            <a:r>
-              <a:rPr sz="1800">
-                <a:solidFill>
-                  <a:srgbClr val="4070A0"/>
-                </a:solidFill>
-                <a:latin typeface="Courier"/>
-              </a:rPr>
-              <a:t> "confirmed"</a:t>
-            </a:r>
-            <a:r>
-              <a:rPr sz="1800">
-                <a:latin typeface="Courier"/>
-              </a:rPr>
-              <a:t>)</a:t>
+              <a:t>:</a:t>
+            </a:r>
+            <a:r>
+              <a:rPr sz="1800">
+                <a:solidFill>
+                  <a:srgbClr val="40A070"/>
+                </a:solidFill>
+                <a:latin typeface="Courier"/>
+              </a:rPr>
+              <a:t>88</a:t>
+            </a:r>
+            <a:r>
+              <a:rPr sz="1800">
+                <a:latin typeface="Courier"/>
+              </a:rPr>
+              <a:t>, ]</a:t>
             </a:r>
             <a:br/>
             <a:br/>
@@ -5941,7 +5844,7 @@
               <a:rPr sz="1800">
                 <a:latin typeface="Courier"/>
               </a:rPr>
-              <a:t>coronaCases &lt;-</a:t>
+              <a:t>coronaTrainTS &lt;-</a:t>
             </a:r>
             <a:r>
               <a:rPr sz="1800">
@@ -5953,25 +5856,56 @@
               <a:t> </a:t>
             </a:r>
             <a:r>
-              <a:rPr sz="1800">
-                <a:latin typeface="Courier"/>
-              </a:rPr>
-              <a:t>corona[, </a:t>
-            </a:r>
-            <a:r>
               <a:rPr sz="1800" b="1">
                 <a:solidFill>
                   <a:srgbClr val="007020"/>
                 </a:solidFill>
                 <a:latin typeface="Courier"/>
               </a:rPr>
-              <a:t>c</a:t>
-            </a:r>
-            <a:r>
-              <a:rPr sz="1800">
-                <a:latin typeface="Courier"/>
-              </a:rPr>
-              <a:t>(</a:t>
+              <a:t>ts</a:t>
+            </a:r>
+            <a:r>
+              <a:rPr sz="1800">
+                <a:latin typeface="Courier"/>
+              </a:rPr>
+              <a:t>(coronaTrain</a:t>
+            </a:r>
+            <a:r>
+              <a:rPr sz="1800">
+                <a:solidFill>
+                  <a:srgbClr val="666666"/>
+                </a:solidFill>
+                <a:latin typeface="Courier"/>
+              </a:rPr>
+              <a:t>$</a:t>
+            </a:r>
+            <a:r>
+              <a:rPr sz="1800">
+                <a:latin typeface="Courier"/>
+              </a:rPr>
+              <a:t>total,</a:t>
+            </a:r>
+            <a:br/>
+            <a:r>
+              <a:rPr sz="1800">
+                <a:latin typeface="Courier"/>
+              </a:rPr>
+              <a:t>            </a:t>
+            </a:r>
+            <a:r>
+              <a:rPr sz="1800">
+                <a:solidFill>
+                  <a:srgbClr val="902000"/>
+                </a:solidFill>
+                <a:latin typeface="Courier"/>
+              </a:rPr>
+              <a:t>start =</a:t>
+            </a:r>
+            <a:r>
+              <a:rPr sz="1800">
+                <a:latin typeface="Courier"/>
+              </a:rPr>
+              <a:t> </a:t>
             </a:r>
             <a:r>
               <a:rPr sz="1800">
@@ -5980,13 +5914,35 @@
                 </a:solidFill>
                 <a:latin typeface="Courier"/>
               </a:rPr>
-              <a:t>5</a:t>
-            </a:r>
-            <a:r>
-              <a:rPr sz="1800">
-                <a:latin typeface="Courier"/>
-              </a:rPr>
-              <a:t>, </a:t>
+              <a:t>1</a:t>
+            </a:r>
+            <a:r>
+              <a:rPr sz="1800">
+                <a:latin typeface="Courier"/>
+              </a:rPr>
+              <a:t>,</a:t>
+            </a:r>
+            <a:br/>
+            <a:r>
+              <a:rPr sz="1800">
+                <a:latin typeface="Courier"/>
+              </a:rPr>
+              <a:t>            </a:t>
+            </a:r>
+            <a:r>
+              <a:rPr sz="1800">
+                <a:solidFill>
+                  <a:srgbClr val="902000"/>
+                </a:solidFill>
+                <a:latin typeface="Courier"/>
+              </a:rPr>
+              <a:t>end =</a:t>
+            </a:r>
+            <a:r>
+              <a:rPr sz="1800">
+                <a:latin typeface="Courier"/>
+              </a:rPr>
+              <a:t> </a:t>
             </a:r>
             <a:r>
               <a:rPr sz="1800">
@@ -5995,13 +5951,50 @@
                 </a:solidFill>
                 <a:latin typeface="Courier"/>
               </a:rPr>
-              <a:t>6</a:t>
-            </a:r>
-            <a:r>
-              <a:rPr sz="1800">
-                <a:latin typeface="Courier"/>
-              </a:rPr>
-              <a:t>)]</a:t>
+              <a:t>81</a:t>
+            </a:r>
+            <a:r>
+              <a:rPr sz="1800">
+                <a:latin typeface="Courier"/>
+              </a:rPr>
+              <a:t>,</a:t>
+            </a:r>
+            <a:br/>
+            <a:r>
+              <a:rPr sz="1800">
+                <a:latin typeface="Courier"/>
+              </a:rPr>
+              <a:t>            </a:t>
+            </a:r>
+            <a:r>
+              <a:rPr sz="1800">
+                <a:solidFill>
+                  <a:srgbClr val="902000"/>
+                </a:solidFill>
+                <a:latin typeface="Courier"/>
+              </a:rPr>
+              <a:t>freq =</a:t>
+            </a:r>
+            <a:r>
+              <a:rPr sz="1800">
+                <a:latin typeface="Courier"/>
+              </a:rPr>
+              <a:t> </a:t>
+            </a:r>
+            <a:r>
+              <a:rPr sz="1800">
+                <a:solidFill>
+                  <a:srgbClr val="40A070"/>
+                </a:solidFill>
+                <a:latin typeface="Courier"/>
+              </a:rPr>
+              <a:t>1</a:t>
+            </a:r>
+            <a:r>
+              <a:rPr sz="1800">
+                <a:latin typeface="Courier"/>
+              </a:rPr>
+              <a:t>)</a:t>
             </a:r>
             <a:br/>
             <a:br/>
@@ -6009,7 +6002,7 @@
               <a:rPr sz="1800">
                 <a:latin typeface="Courier"/>
               </a:rPr>
-              <a:t>coronaTotal &lt;-</a:t>
+              <a:t>coronaValidTS &lt;-</a:t>
             </a:r>
             <a:r>
               <a:rPr sz="1800">
@@ -6021,10 +6014,19 @@
               <a:t> </a:t>
             </a:r>
             <a:r>
-              <a:rPr sz="1800">
-                <a:latin typeface="Courier"/>
-              </a:rPr>
-              <a:t>coronaCases </a:t>
+              <a:rPr sz="1800" b="1">
+                <a:solidFill>
+                  <a:srgbClr val="007020"/>
+                </a:solidFill>
+                <a:latin typeface="Courier"/>
+              </a:rPr>
+              <a:t>ts</a:t>
+            </a:r>
+            <a:r>
+              <a:rPr sz="1800">
+                <a:latin typeface="Courier"/>
+              </a:rPr>
+              <a:t>(coronaValid</a:t>
             </a:r>
             <a:r>
               <a:rPr sz="1800">
@@ -6033,32 +6035,20 @@
                 </a:solidFill>
                 <a:latin typeface="Courier"/>
               </a:rPr>
-              <a:t>%&gt;%</a:t>
+              <a:t>$</a:t>
+            </a:r>
+            <a:r>
+              <a:rPr sz="1800">
+                <a:latin typeface="Courier"/>
+              </a:rPr>
+              <a:t>total,</a:t>
             </a:r>
             <a:br/>
             <a:r>
               <a:rPr sz="1800">
-                <a:solidFill>
-                  <a:srgbClr val="4070A0"/>
-                </a:solidFill>
-                <a:latin typeface="Courier"/>
-              </a:rPr>
-              <a:t>  </a:t>
-            </a:r>
-            <a:r>
-              <a:rPr sz="1800" b="1">
-                <a:solidFill>
-                  <a:srgbClr val="007020"/>
-                </a:solidFill>
-                <a:latin typeface="Courier"/>
-              </a:rPr>
-              <a:t>mutate</a:t>
-            </a:r>
-            <a:r>
-              <a:rPr sz="1800">
-                <a:latin typeface="Courier"/>
-              </a:rPr>
-              <a:t>(</a:t>
+                <a:latin typeface="Courier"/>
+              </a:rPr>
+              <a:t>                   </a:t>
             </a:r>
             <a:r>
               <a:rPr sz="1800">
@@ -6067,36 +6057,87 @@
                 </a:solidFill>
                 <a:latin typeface="Courier"/>
               </a:rPr>
-              <a:t>total =</a:t>
-            </a:r>
-            <a:r>
-              <a:rPr sz="1800">
-                <a:latin typeface="Courier"/>
-              </a:rPr>
-              <a:t> </a:t>
-            </a:r>
-            <a:r>
-              <a:rPr sz="1800" b="1">
-                <a:solidFill>
-                  <a:srgbClr val="007020"/>
-                </a:solidFill>
-                <a:latin typeface="Courier"/>
-              </a:rPr>
-              <a:t>cumsum</a:t>
-            </a:r>
-            <a:r>
-              <a:rPr sz="1800">
-                <a:latin typeface="Courier"/>
-              </a:rPr>
-              <a:t>(cases))</a:t>
+              <a:t>start =</a:t>
+            </a:r>
+            <a:r>
+              <a:rPr sz="1800">
+                <a:latin typeface="Courier"/>
+              </a:rPr>
+              <a:t> </a:t>
+            </a:r>
+            <a:r>
+              <a:rPr sz="1800">
+                <a:solidFill>
+                  <a:srgbClr val="40A070"/>
+                </a:solidFill>
+                <a:latin typeface="Courier"/>
+              </a:rPr>
+              <a:t>82</a:t>
+            </a:r>
+            <a:r>
+              <a:rPr sz="1800">
+                <a:latin typeface="Courier"/>
+              </a:rPr>
+              <a:t>,</a:t>
             </a:r>
             <a:br/>
+            <a:r>
+              <a:rPr sz="1800">
+                <a:latin typeface="Courier"/>
+              </a:rPr>
+              <a:t>                   </a:t>
+            </a:r>
+            <a:r>
+              <a:rPr sz="1800">
+                <a:solidFill>
+                  <a:srgbClr val="902000"/>
+                </a:solidFill>
+                <a:latin typeface="Courier"/>
+              </a:rPr>
+              <a:t>end =</a:t>
+            </a:r>
+            <a:r>
+              <a:rPr sz="1800">
+                <a:latin typeface="Courier"/>
+              </a:rPr>
+              <a:t> </a:t>
+            </a:r>
+            <a:r>
+              <a:rPr sz="1800">
+                <a:solidFill>
+                  <a:srgbClr val="40A070"/>
+                </a:solidFill>
+                <a:latin typeface="Courier"/>
+              </a:rPr>
+              <a:t>88</a:t>
+            </a:r>
+            <a:r>
+              <a:rPr sz="1800">
+                <a:latin typeface="Courier"/>
+              </a:rPr>
+              <a:t>,</a:t>
+            </a:r>
             <a:br/>
             <a:r>
               <a:rPr sz="1800">
                 <a:latin typeface="Courier"/>
               </a:rPr>
-              <a:t>coronaTotal[</a:t>
+              <a:t>                   </a:t>
+            </a:r>
+            <a:r>
+              <a:rPr sz="1800">
+                <a:solidFill>
+                  <a:srgbClr val="902000"/>
+                </a:solidFill>
+                <a:latin typeface="Courier"/>
+              </a:rPr>
+              <a:t>freq =</a:t>
+            </a:r>
+            <a:r>
+              <a:rPr sz="1800">
+                <a:latin typeface="Courier"/>
+              </a:rPr>
+              <a:t> </a:t>
             </a:r>
             <a:r>
               <a:rPr sz="1800">
@@ -6105,58 +6146,13 @@
                 </a:solidFill>
                 <a:latin typeface="Courier"/>
               </a:rPr>
-              <a:t>82</a:t>
-            </a:r>
-            <a:r>
-              <a:rPr sz="1800">
-                <a:solidFill>
-                  <a:srgbClr val="666666"/>
-                </a:solidFill>
-                <a:latin typeface="Courier"/>
-              </a:rPr>
-              <a:t>:</a:t>
-            </a:r>
-            <a:r>
-              <a:rPr sz="1800">
-                <a:solidFill>
-                  <a:srgbClr val="40A070"/>
-                </a:solidFill>
-                <a:latin typeface="Courier"/>
-              </a:rPr>
-              <a:t>88</a:t>
-            </a:r>
-            <a:r>
-              <a:rPr sz="1800">
-                <a:latin typeface="Courier"/>
-              </a:rPr>
-              <a:t>, ] </a:t>
-            </a:r>
-            <a:r>
-              <a:rPr sz="1800" i="1">
-                <a:solidFill>
-                  <a:srgbClr val="60A0B0"/>
-                </a:solidFill>
-                <a:latin typeface="Courier"/>
-              </a:rPr>
-              <a:t># Validation set</a:t>
-            </a:r>
-          </a:p>
-          <a:p>
-            <a:pPr lvl="0" marL="1270000" indent="0">
-              <a:buNone/>
-            </a:pPr>
-            <a:r>
-              <a:rPr sz="1800">
-                <a:latin typeface="Courier"/>
-              </a:rPr>
-              <a:t>##          date cases  total
-## 82 2020-04-12 28917 555313
-## 83 2020-04-13 25306 580619
-## 84 2020-04-14 27051 607670
-## 85 2020-04-15 28680 636350
-## 86 2020-04-16 31451 667801
-## 87 2020-04-17 31905 699706
-## 88 2020-04-18 32491 732197</a:t>
+              <a:t>1</a:t>
+            </a:r>
+            <a:r>
+              <a:rPr sz="1800">
+                <a:latin typeface="Courier"/>
+              </a:rPr>
+              <a:t>)</a:t>
             </a:r>
           </a:p>
         </p:txBody>
@@ -6203,507 +6199,6 @@
             </a:pPr>
             <a:r>
               <a:rPr/>
-              <a:t>Time</a:t>
-            </a:r>
-            <a:r>
-              <a:rPr/>
-              <a:t> </a:t>
-            </a:r>
-            <a:r>
-              <a:rPr/>
-              <a:t>Series</a:t>
-            </a:r>
-          </a:p>
-        </p:txBody>
-      </p:sp>
-      <p:sp>
-        <p:nvSpPr>
-          <p:cNvPr id="3" name="Content Placeholder 2"/>
-          <p:cNvSpPr>
-            <a:spLocks noGrp="1"/>
-          </p:cNvSpPr>
-          <p:nvPr>
-            <p:ph idx="1"/>
-          </p:nvPr>
-        </p:nvSpPr>
-        <p:spPr/>
-        <p:txBody>
-          <a:bodyPr/>
-          <a:lstStyle/>
-          <a:p>
-            <a:pPr lvl="0" marL="1270000" indent="0">
-              <a:buNone/>
-            </a:pPr>
-            <a:r>
-              <a:rPr sz="1800">
-                <a:latin typeface="Courier"/>
-              </a:rPr>
-              <a:t>coronaTrain &lt;-</a:t>
-            </a:r>
-            <a:r>
-              <a:rPr sz="1800">
-                <a:solidFill>
-                  <a:srgbClr val="4070A0"/>
-                </a:solidFill>
-                <a:latin typeface="Courier"/>
-              </a:rPr>
-              <a:t> </a:t>
-            </a:r>
-            <a:r>
-              <a:rPr sz="1800">
-                <a:latin typeface="Courier"/>
-              </a:rPr>
-              <a:t>coronaTotal[</a:t>
-            </a:r>
-            <a:r>
-              <a:rPr sz="1800">
-                <a:solidFill>
-                  <a:srgbClr val="40A070"/>
-                </a:solidFill>
-                <a:latin typeface="Courier"/>
-              </a:rPr>
-              <a:t>1</a:t>
-            </a:r>
-            <a:r>
-              <a:rPr sz="1800">
-                <a:solidFill>
-                  <a:srgbClr val="666666"/>
-                </a:solidFill>
-                <a:latin typeface="Courier"/>
-              </a:rPr>
-              <a:t>:</a:t>
-            </a:r>
-            <a:r>
-              <a:rPr sz="1800">
-                <a:solidFill>
-                  <a:srgbClr val="40A070"/>
-                </a:solidFill>
-                <a:latin typeface="Courier"/>
-              </a:rPr>
-              <a:t>81</a:t>
-            </a:r>
-            <a:r>
-              <a:rPr sz="1800">
-                <a:latin typeface="Courier"/>
-              </a:rPr>
-              <a:t>, ]</a:t>
-            </a:r>
-            <a:br/>
-            <a:r>
-              <a:rPr sz="1800">
-                <a:latin typeface="Courier"/>
-              </a:rPr>
-              <a:t>coronaValid &lt;-</a:t>
-            </a:r>
-            <a:r>
-              <a:rPr sz="1800">
-                <a:solidFill>
-                  <a:srgbClr val="4070A0"/>
-                </a:solidFill>
-                <a:latin typeface="Courier"/>
-              </a:rPr>
-              <a:t> </a:t>
-            </a:r>
-            <a:r>
-              <a:rPr sz="1800">
-                <a:latin typeface="Courier"/>
-              </a:rPr>
-              <a:t>coronaTotal[</a:t>
-            </a:r>
-            <a:r>
-              <a:rPr sz="1800">
-                <a:solidFill>
-                  <a:srgbClr val="40A070"/>
-                </a:solidFill>
-                <a:latin typeface="Courier"/>
-              </a:rPr>
-              <a:t>82</a:t>
-            </a:r>
-            <a:r>
-              <a:rPr sz="1800">
-                <a:solidFill>
-                  <a:srgbClr val="666666"/>
-                </a:solidFill>
-                <a:latin typeface="Courier"/>
-              </a:rPr>
-              <a:t>:</a:t>
-            </a:r>
-            <a:r>
-              <a:rPr sz="1800">
-                <a:solidFill>
-                  <a:srgbClr val="40A070"/>
-                </a:solidFill>
-                <a:latin typeface="Courier"/>
-              </a:rPr>
-              <a:t>88</a:t>
-            </a:r>
-            <a:r>
-              <a:rPr sz="1800">
-                <a:latin typeface="Courier"/>
-              </a:rPr>
-              <a:t>, ]</a:t>
-            </a:r>
-            <a:br/>
-            <a:br/>
-            <a:r>
-              <a:rPr sz="1800">
-                <a:latin typeface="Courier"/>
-              </a:rPr>
-              <a:t>coronaTrainTS &lt;-</a:t>
-            </a:r>
-            <a:r>
-              <a:rPr sz="1800">
-                <a:solidFill>
-                  <a:srgbClr val="4070A0"/>
-                </a:solidFill>
-                <a:latin typeface="Courier"/>
-              </a:rPr>
-              <a:t> </a:t>
-            </a:r>
-            <a:r>
-              <a:rPr sz="1800" b="1">
-                <a:solidFill>
-                  <a:srgbClr val="007020"/>
-                </a:solidFill>
-                <a:latin typeface="Courier"/>
-              </a:rPr>
-              <a:t>ts</a:t>
-            </a:r>
-            <a:r>
-              <a:rPr sz="1800">
-                <a:latin typeface="Courier"/>
-              </a:rPr>
-              <a:t>(coronaTrain</a:t>
-            </a:r>
-            <a:r>
-              <a:rPr sz="1800">
-                <a:solidFill>
-                  <a:srgbClr val="666666"/>
-                </a:solidFill>
-                <a:latin typeface="Courier"/>
-              </a:rPr>
-              <a:t>$</a:t>
-            </a:r>
-            <a:r>
-              <a:rPr sz="1800">
-                <a:latin typeface="Courier"/>
-              </a:rPr>
-              <a:t>total,</a:t>
-            </a:r>
-            <a:br/>
-            <a:r>
-              <a:rPr sz="1800">
-                <a:latin typeface="Courier"/>
-              </a:rPr>
-              <a:t>            </a:t>
-            </a:r>
-            <a:r>
-              <a:rPr sz="1800">
-                <a:solidFill>
-                  <a:srgbClr val="902000"/>
-                </a:solidFill>
-                <a:latin typeface="Courier"/>
-              </a:rPr>
-              <a:t>start =</a:t>
-            </a:r>
-            <a:r>
-              <a:rPr sz="1800">
-                <a:latin typeface="Courier"/>
-              </a:rPr>
-              <a:t> </a:t>
-            </a:r>
-            <a:r>
-              <a:rPr sz="1800">
-                <a:solidFill>
-                  <a:srgbClr val="40A070"/>
-                </a:solidFill>
-                <a:latin typeface="Courier"/>
-              </a:rPr>
-              <a:t>1</a:t>
-            </a:r>
-            <a:r>
-              <a:rPr sz="1800">
-                <a:latin typeface="Courier"/>
-              </a:rPr>
-              <a:t>,</a:t>
-            </a:r>
-            <a:br/>
-            <a:r>
-              <a:rPr sz="1800">
-                <a:latin typeface="Courier"/>
-              </a:rPr>
-              <a:t>            </a:t>
-            </a:r>
-            <a:r>
-              <a:rPr sz="1800">
-                <a:solidFill>
-                  <a:srgbClr val="902000"/>
-                </a:solidFill>
-                <a:latin typeface="Courier"/>
-              </a:rPr>
-              <a:t>end =</a:t>
-            </a:r>
-            <a:r>
-              <a:rPr sz="1800">
-                <a:latin typeface="Courier"/>
-              </a:rPr>
-              <a:t> </a:t>
-            </a:r>
-            <a:r>
-              <a:rPr sz="1800">
-                <a:solidFill>
-                  <a:srgbClr val="40A070"/>
-                </a:solidFill>
-                <a:latin typeface="Courier"/>
-              </a:rPr>
-              <a:t>81</a:t>
-            </a:r>
-            <a:r>
-              <a:rPr sz="1800">
-                <a:latin typeface="Courier"/>
-              </a:rPr>
-              <a:t>,</a:t>
-            </a:r>
-            <a:br/>
-            <a:r>
-              <a:rPr sz="1800">
-                <a:latin typeface="Courier"/>
-              </a:rPr>
-              <a:t>            </a:t>
-            </a:r>
-            <a:r>
-              <a:rPr sz="1800">
-                <a:solidFill>
-                  <a:srgbClr val="902000"/>
-                </a:solidFill>
-                <a:latin typeface="Courier"/>
-              </a:rPr>
-              <a:t>freq =</a:t>
-            </a:r>
-            <a:r>
-              <a:rPr sz="1800">
-                <a:latin typeface="Courier"/>
-              </a:rPr>
-              <a:t> </a:t>
-            </a:r>
-            <a:r>
-              <a:rPr sz="1800">
-                <a:solidFill>
-                  <a:srgbClr val="40A070"/>
-                </a:solidFill>
-                <a:latin typeface="Courier"/>
-              </a:rPr>
-              <a:t>1</a:t>
-            </a:r>
-            <a:r>
-              <a:rPr sz="1800">
-                <a:latin typeface="Courier"/>
-              </a:rPr>
-              <a:t>)</a:t>
-            </a:r>
-            <a:br/>
-            <a:br/>
-            <a:r>
-              <a:rPr sz="1800">
-                <a:latin typeface="Courier"/>
-              </a:rPr>
-              <a:t>coronaValidTS &lt;-</a:t>
-            </a:r>
-            <a:r>
-              <a:rPr sz="1800">
-                <a:solidFill>
-                  <a:srgbClr val="4070A0"/>
-                </a:solidFill>
-                <a:latin typeface="Courier"/>
-              </a:rPr>
-              <a:t> </a:t>
-            </a:r>
-            <a:r>
-              <a:rPr sz="1800" b="1">
-                <a:solidFill>
-                  <a:srgbClr val="007020"/>
-                </a:solidFill>
-                <a:latin typeface="Courier"/>
-              </a:rPr>
-              <a:t>ts</a:t>
-            </a:r>
-            <a:r>
-              <a:rPr sz="1800">
-                <a:latin typeface="Courier"/>
-              </a:rPr>
-              <a:t>(coronaValid</a:t>
-            </a:r>
-            <a:r>
-              <a:rPr sz="1800">
-                <a:solidFill>
-                  <a:srgbClr val="666666"/>
-                </a:solidFill>
-                <a:latin typeface="Courier"/>
-              </a:rPr>
-              <a:t>$</a:t>
-            </a:r>
-            <a:r>
-              <a:rPr sz="1800">
-                <a:latin typeface="Courier"/>
-              </a:rPr>
-              <a:t>total,</a:t>
-            </a:r>
-            <a:br/>
-            <a:r>
-              <a:rPr sz="1800">
-                <a:latin typeface="Courier"/>
-              </a:rPr>
-              <a:t>                   </a:t>
-            </a:r>
-            <a:r>
-              <a:rPr sz="1800">
-                <a:solidFill>
-                  <a:srgbClr val="902000"/>
-                </a:solidFill>
-                <a:latin typeface="Courier"/>
-              </a:rPr>
-              <a:t>start =</a:t>
-            </a:r>
-            <a:r>
-              <a:rPr sz="1800">
-                <a:latin typeface="Courier"/>
-              </a:rPr>
-              <a:t> </a:t>
-            </a:r>
-            <a:r>
-              <a:rPr sz="1800">
-                <a:solidFill>
-                  <a:srgbClr val="40A070"/>
-                </a:solidFill>
-                <a:latin typeface="Courier"/>
-              </a:rPr>
-              <a:t>82</a:t>
-            </a:r>
-            <a:r>
-              <a:rPr sz="1800">
-                <a:latin typeface="Courier"/>
-              </a:rPr>
-              <a:t>,</a:t>
-            </a:r>
-            <a:br/>
-            <a:r>
-              <a:rPr sz="1800">
-                <a:latin typeface="Courier"/>
-              </a:rPr>
-              <a:t>                   </a:t>
-            </a:r>
-            <a:r>
-              <a:rPr sz="1800">
-                <a:solidFill>
-                  <a:srgbClr val="902000"/>
-                </a:solidFill>
-                <a:latin typeface="Courier"/>
-              </a:rPr>
-              <a:t>end =</a:t>
-            </a:r>
-            <a:r>
-              <a:rPr sz="1800">
-                <a:latin typeface="Courier"/>
-              </a:rPr>
-              <a:t> </a:t>
-            </a:r>
-            <a:r>
-              <a:rPr sz="1800">
-                <a:solidFill>
-                  <a:srgbClr val="40A070"/>
-                </a:solidFill>
-                <a:latin typeface="Courier"/>
-              </a:rPr>
-              <a:t>88</a:t>
-            </a:r>
-            <a:r>
-              <a:rPr sz="1800">
-                <a:latin typeface="Courier"/>
-              </a:rPr>
-              <a:t>,</a:t>
-            </a:r>
-            <a:br/>
-            <a:r>
-              <a:rPr sz="1800">
-                <a:latin typeface="Courier"/>
-              </a:rPr>
-              <a:t>                   </a:t>
-            </a:r>
-            <a:r>
-              <a:rPr sz="1800">
-                <a:solidFill>
-                  <a:srgbClr val="902000"/>
-                </a:solidFill>
-                <a:latin typeface="Courier"/>
-              </a:rPr>
-              <a:t>freq =</a:t>
-            </a:r>
-            <a:r>
-              <a:rPr sz="1800">
-                <a:latin typeface="Courier"/>
-              </a:rPr>
-              <a:t> </a:t>
-            </a:r>
-            <a:r>
-              <a:rPr sz="1800">
-                <a:solidFill>
-                  <a:srgbClr val="40A070"/>
-                </a:solidFill>
-                <a:latin typeface="Courier"/>
-              </a:rPr>
-              <a:t>1</a:t>
-            </a:r>
-            <a:r>
-              <a:rPr sz="1800">
-                <a:latin typeface="Courier"/>
-              </a:rPr>
-              <a:t>)</a:t>
-            </a:r>
-          </a:p>
-        </p:txBody>
-      </p:sp>
-    </p:spTree>
-  </p:cSld>
-</p:sld>
-</file>
-
-<file path=ppt/slides/slide6.xml><?xml version="1.0" encoding="utf-8"?>
-<p:sld xmlns:a="http://schemas.openxmlformats.org/drawingml/2006/main" xmlns:r="http://schemas.openxmlformats.org/officeDocument/2006/relationships" xmlns:p="http://schemas.openxmlformats.org/presentationml/2006/main">
-  <p:cSld>
-    <p:spTree>
-      <p:nvGrpSpPr>
-        <p:cNvPr id="1" name=""/>
-        <p:cNvGrpSpPr/>
-        <p:nvPr/>
-      </p:nvGrpSpPr>
-      <p:grpSpPr>
-        <a:xfrm>
-          <a:off x="0" y="0"/>
-          <a:ext cx="0" cy="0"/>
-          <a:chOff x="0" y="0"/>
-          <a:chExt cx="0" cy="0"/>
-        </a:xfrm>
-      </p:grpSpPr>
-      <p:sp>
-        <p:nvSpPr>
-          <p:cNvPr id="2" name="Title 1"/>
-          <p:cNvSpPr>
-            <a:spLocks noGrp="1"/>
-          </p:cNvSpPr>
-          <p:nvPr>
-            <p:ph type="title"/>
-          </p:nvPr>
-        </p:nvSpPr>
-        <p:spPr/>
-        <p:txBody>
-          <a:bodyPr/>
-          <a:lstStyle/>
-          <a:p>
-            <a:pPr lvl="0" marL="0" indent="0">
-              <a:buNone/>
-            </a:pPr>
-            <a:r>
-              <a:rPr/>
               <a:t>Linear</a:t>
             </a:r>
             <a:r>
@@ -6766,7 +6261,7 @@
 </p:sld>
 </file>
 
-<file path=ppt/slides/slide7.xml><?xml version="1.0" encoding="utf-8"?>
+<file path=ppt/slides/slide6.xml><?xml version="1.0" encoding="utf-8"?>
 <p:sld xmlns:a="http://schemas.openxmlformats.org/drawingml/2006/main" xmlns:r="http://schemas.openxmlformats.org/officeDocument/2006/relationships" xmlns:p="http://schemas.openxmlformats.org/presentationml/2006/main">
   <p:cSld>
     <p:spTree>
@@ -6859,6 +6354,97 @@
 </p:sld>
 </file>
 
+<file path=ppt/slides/slide7.xml><?xml version="1.0" encoding="utf-8"?>
+<p:sld xmlns:a="http://schemas.openxmlformats.org/drawingml/2006/main" xmlns:r="http://schemas.openxmlformats.org/officeDocument/2006/relationships" xmlns:p="http://schemas.openxmlformats.org/presentationml/2006/main">
+  <p:cSld>
+    <p:spTree>
+      <p:nvGrpSpPr>
+        <p:cNvPr id="1" name=""/>
+        <p:cNvGrpSpPr/>
+        <p:nvPr/>
+      </p:nvGrpSpPr>
+      <p:grpSpPr>
+        <a:xfrm>
+          <a:off x="0" y="0"/>
+          <a:ext cx="0" cy="0"/>
+          <a:chOff x="0" y="0"/>
+          <a:chExt cx="0" cy="0"/>
+        </a:xfrm>
+      </p:grpSpPr>
+      <p:sp>
+        <p:nvSpPr>
+          <p:cNvPr id="2" name="Title 1"/>
+          <p:cNvSpPr>
+            <a:spLocks noGrp="1"/>
+          </p:cNvSpPr>
+          <p:nvPr>
+            <p:ph type="title"/>
+          </p:nvPr>
+        </p:nvSpPr>
+        <p:spPr/>
+        <p:txBody>
+          <a:bodyPr/>
+          <a:lstStyle/>
+          <a:p>
+            <a:pPr lvl="0" marL="0" indent="0">
+              <a:buNone/>
+            </a:pPr>
+            <a:r>
+              <a:rPr/>
+              <a:t>Linear</a:t>
+            </a:r>
+            <a:r>
+              <a:rPr/>
+              <a:t> </a:t>
+            </a:r>
+            <a:r>
+              <a:rPr/>
+              <a:t>Model:</a:t>
+            </a:r>
+            <a:r>
+              <a:rPr/>
+              <a:t> </a:t>
+            </a:r>
+            <a:r>
+              <a:rPr/>
+              <a:t>Accuracy</a:t>
+            </a:r>
+          </a:p>
+        </p:txBody>
+      </p:sp>
+      <p:sp>
+        <p:nvSpPr>
+          <p:cNvPr id="3" name="Content Placeholder 2"/>
+          <p:cNvSpPr>
+            <a:spLocks noGrp="1"/>
+          </p:cNvSpPr>
+          <p:nvPr>
+            <p:ph idx="1"/>
+          </p:nvPr>
+        </p:nvSpPr>
+        <p:spPr/>
+        <p:txBody>
+          <a:bodyPr/>
+          <a:lstStyle/>
+          <a:p>
+            <a:pPr lvl="0" marL="1270000" indent="0">
+              <a:buNone/>
+            </a:pPr>
+            <a:r>
+              <a:rPr sz="1800">
+                <a:latin typeface="Courier"/>
+              </a:rPr>
+              <a:t>##              ME   RMSE    MAE  MPE MAPE  ACF1 Theil's U
+## Test set 404792 408052 404792 63.1 63.1 0.575      14.1</a:t>
+            </a:r>
+          </a:p>
+        </p:txBody>
+      </p:sp>
+    </p:spTree>
+  </p:cSld>
+</p:sld>
+</file>
+
 <file path=ppt/slides/slide8.xml><?xml version="1.0" encoding="utf-8"?>
 <p:sld xmlns:a="http://schemas.openxmlformats.org/drawingml/2006/main" xmlns:r="http://schemas.openxmlformats.org/officeDocument/2006/relationships" xmlns:p="http://schemas.openxmlformats.org/presentationml/2006/main">
   <p:cSld>
@@ -6896,23 +6482,15 @@
             </a:pPr>
             <a:r>
               <a:rPr/>
-              <a:t>Linear</a:t>
-            </a:r>
-            <a:r>
-              <a:rPr/>
-              <a:t> </a:t>
-            </a:r>
-            <a:r>
-              <a:rPr/>
-              <a:t>Model:</a:t>
-            </a:r>
-            <a:r>
-              <a:rPr/>
-              <a:t> </a:t>
-            </a:r>
-            <a:r>
-              <a:rPr/>
-              <a:t>Accuracy</a:t>
+              <a:t>Quadratic</a:t>
+            </a:r>
+            <a:r>
+              <a:rPr/>
+              <a:t> </a:t>
+            </a:r>
+            <a:r>
+              <a:rPr/>
+              <a:t>Model</a:t>
             </a:r>
           </a:p>
         </p:txBody>
@@ -6939,8 +6517,25 @@
               <a:rPr sz="1800">
                 <a:latin typeface="Courier"/>
               </a:rPr>
-              <a:t>##              ME   RMSE    MAE  MPE MAPE  ACF1 Theil's U
-## Test set 404792 408052 404792 63.1 63.1 0.575      14.1</a:t>
+              <a:t>## 
+## Call:
+## tslm(formula = coronaTrainTS ~ trend + I(trend^2))
+## 
+## Residuals:
+##    Min     1Q Median     3Q    Max 
+## -85436 -44644   7231  40733 135957 
+## 
+## Coefficients:
+##             Estimate Std. Error t value             Pr(&gt;|t|)    
+## (Intercept)  87603.0    18123.4    4.83    0.000006587539966 ***
+## trend        -9402.0     1020.1   -9.22    0.000000000000041 ***
+## I(trend^2)     162.2       12.1   13.46 &lt; 0.0000000000000002 ***
+## ---
+## Signif. codes:  0 '***' 0.001 '**' 0.01 '*' 0.05 '.' 0.1 ' ' 1
+## 
+## Residual standard error: 53000 on 78 degrees of freedom
+## Multiple R-squared:  0.844,  Adjusted R-squared:  0.84 
+## F-statistic:  210 on 2 and 78 DF,  p-value: &lt;0.0000000000000002</a:t>
             </a:r>
           </a:p>
         </p:txBody>
@@ -6995,56 +6590,49 @@
             </a:r>
             <a:r>
               <a:rPr/>
-              <a:t>Model</a:t>
-            </a:r>
-          </a:p>
-        </p:txBody>
-      </p:sp>
-      <p:sp>
-        <p:nvSpPr>
-          <p:cNvPr id="3" name="Content Placeholder 2"/>
-          <p:cNvSpPr>
-            <a:spLocks noGrp="1"/>
-          </p:cNvSpPr>
-          <p:nvPr>
-            <p:ph idx="1"/>
-          </p:nvPr>
-        </p:nvSpPr>
-        <p:spPr/>
-        <p:txBody>
-          <a:bodyPr/>
-          <a:lstStyle/>
-          <a:p>
-            <a:pPr lvl="0" marL="1270000" indent="0">
-              <a:buNone/>
-            </a:pPr>
-            <a:r>
-              <a:rPr sz="1800">
-                <a:latin typeface="Courier"/>
-              </a:rPr>
-              <a:t>## 
-## Call:
-## tslm(formula = coronaTrainTS ~ trend + I(trend^2))
-## 
-## Residuals:
-##    Min     1Q Median     3Q    Max 
-## -85436 -44644   7231  40733 135957 
-## 
-## Coefficients:
-##             Estimate Std. Error t value             Pr(&gt;|t|)    
-## (Intercept)  87603.0    18123.4    4.83    0.000006587539966 ***
-## trend        -9402.0     1020.1   -9.22    0.000000000000041 ***
-## I(trend^2)     162.2       12.1   13.46 &lt; 0.0000000000000002 ***
-## ---
-## Signif. codes:  0 '***' 0.001 '**' 0.01 '*' 0.05 '.' 0.1 ' ' 1
-## 
-## Residual standard error: 53000 on 78 degrees of freedom
-## Multiple R-squared:  0.844,  Adjusted R-squared:  0.84 
-## F-statistic:  210 on 2 and 78 DF,  p-value: &lt;0.0000000000000002</a:t>
-            </a:r>
-          </a:p>
-        </p:txBody>
-      </p:sp>
+              <a:t>Model:</a:t>
+            </a:r>
+            <a:r>
+              <a:rPr/>
+              <a:t> </a:t>
+            </a:r>
+            <a:r>
+              <a:rPr/>
+              <a:t>Forecast</a:t>
+            </a:r>
+          </a:p>
+        </p:txBody>
+      </p:sp>
+      <p:pic>
+        <p:nvPicPr>
+          <p:cNvPr descr="covid19_files/figure-pptx/unnamed-chunk-10-1.png" id="0" name="Picture 1"/>
+          <p:cNvPicPr>
+            <a:picLocks noGrp="1" noChangeAspect="1"/>
+          </p:cNvPicPr>
+          <p:nvPr/>
+        </p:nvPicPr>
+        <p:blipFill>
+          <a:blip r:embed="rId2"/>
+          <a:stretch>
+            <a:fillRect/>
+          </a:stretch>
+        </p:blipFill>
+        <p:spPr bwMode="auto">
+          <a:xfrm>
+            <a:off x="1752600" y="1600200"/>
+            <a:ext cx="5651500" cy="4521200"/>
+          </a:xfrm>
+          <a:prstGeom prst="rect">
+            <a:avLst/>
+          </a:prstGeom>
+          <a:noFill/>
+          <a:ln w="9525">
+            <a:noFill/>
+            <a:headEnd/>
+            <a:tailEnd/>
+          </a:ln>
+        </p:spPr>
+      </p:pic>
     </p:spTree>
   </p:cSld>
 </p:sld>

</xml_diff>